<commit_message>
CN-6 #comment ZZ: Presentation and README.md polished
</commit_message>
<xml_diff>
--- a/documentation/presentation/presentation.pptx
+++ b/documentation/presentation/presentation.pptx
@@ -8,13 +8,17 @@
     <p:sldId id="256" r:id="rId2"/>
     <p:sldId id="257" r:id="rId3"/>
     <p:sldId id="258" r:id="rId4"/>
-    <p:sldId id="260" r:id="rId5"/>
-    <p:sldId id="259" r:id="rId6"/>
-    <p:sldId id="262" r:id="rId7"/>
-    <p:sldId id="261" r:id="rId8"/>
-    <p:sldId id="263" r:id="rId9"/>
-    <p:sldId id="264" r:id="rId10"/>
-    <p:sldId id="265" r:id="rId11"/>
+    <p:sldId id="269" r:id="rId5"/>
+    <p:sldId id="260" r:id="rId6"/>
+    <p:sldId id="259" r:id="rId7"/>
+    <p:sldId id="267" r:id="rId8"/>
+    <p:sldId id="262" r:id="rId9"/>
+    <p:sldId id="261" r:id="rId10"/>
+    <p:sldId id="263" r:id="rId11"/>
+    <p:sldId id="268" r:id="rId12"/>
+    <p:sldId id="266" r:id="rId13"/>
+    <p:sldId id="264" r:id="rId14"/>
+    <p:sldId id="265" r:id="rId15"/>
   </p:sldIdLst>
   <p:sldSz cx="12192000" cy="6858000"/>
   <p:notesSz cx="6858000" cy="9144000"/>
@@ -113,6 +117,11 @@
       </a:defRPr>
     </a:lvl9pPr>
   </p:defaultTextStyle>
+  <p:extLst>
+    <p:ext uri="{EFAFB233-063F-42B5-8137-9DF3F51BA10A}">
+      <p15:sldGuideLst xmlns:p15="http://schemas.microsoft.com/office/powerpoint/2012/main"/>
+    </p:ext>
+  </p:extLst>
 </p:presentation>
 </file>
 
@@ -5463,6 +5472,823 @@
           <p:cNvPr id="2" name="Title 1">
             <a:extLst>
               <a:ext uri="{FF2B5EF4-FFF2-40B4-BE49-F238E27FC236}">
+                <a16:creationId xmlns:a16="http://schemas.microsoft.com/office/drawing/2014/main" id="{1DF90525-B7BF-4674-94C0-1E13470D8AEE}"/>
+              </a:ext>
+            </a:extLst>
+          </p:cNvPr>
+          <p:cNvSpPr>
+            <a:spLocks noGrp="1"/>
+          </p:cNvSpPr>
+          <p:nvPr>
+            <p:ph type="title"/>
+          </p:nvPr>
+        </p:nvSpPr>
+        <p:spPr>
+          <a:xfrm>
+            <a:off x="0" y="5493867"/>
+            <a:ext cx="8534400" cy="1507067"/>
+          </a:xfrm>
+        </p:spPr>
+        <p:txBody>
+          <a:bodyPr/>
+          <a:lstStyle/>
+          <a:p>
+            <a:r>
+              <a:rPr lang="en-GB" dirty="0" err="1"/>
+              <a:t>Javascript</a:t>
+            </a:r>
+            <a:endParaRPr lang="en-GB" dirty="0"/>
+          </a:p>
+        </p:txBody>
+      </p:sp>
+      <p:pic>
+        <p:nvPicPr>
+          <p:cNvPr id="5" name="Content Placeholder 4">
+            <a:extLst>
+              <a:ext uri="{FF2B5EF4-FFF2-40B4-BE49-F238E27FC236}">
+                <a16:creationId xmlns:a16="http://schemas.microsoft.com/office/drawing/2014/main" id="{ACBEC5A6-9401-47C4-98D8-370EB2C4CF02}"/>
+              </a:ext>
+            </a:extLst>
+          </p:cNvPr>
+          <p:cNvPicPr>
+            <a:picLocks noGrp="1" noChangeAspect="1"/>
+          </p:cNvPicPr>
+          <p:nvPr>
+            <p:ph idx="1"/>
+          </p:nvPr>
+        </p:nvPicPr>
+        <p:blipFill rotWithShape="1">
+          <a:blip r:embed="rId2">
+            <a:extLst>
+              <a:ext uri="{28A0092B-C50C-407E-A947-70E740481C1C}">
+                <a14:useLocalDpi xmlns:a14="http://schemas.microsoft.com/office/drawing/2010/main" val="0"/>
+              </a:ext>
+            </a:extLst>
+          </a:blip>
+          <a:srcRect r="60282"/>
+          <a:stretch/>
+        </p:blipFill>
+        <p:spPr>
+          <a:xfrm>
+            <a:off x="5343759" y="67113"/>
+            <a:ext cx="3959632" cy="5233922"/>
+          </a:xfrm>
+        </p:spPr>
+      </p:pic>
+      <p:pic>
+        <p:nvPicPr>
+          <p:cNvPr id="7" name="Picture 6">
+            <a:extLst>
+              <a:ext uri="{FF2B5EF4-FFF2-40B4-BE49-F238E27FC236}">
+                <a16:creationId xmlns:a16="http://schemas.microsoft.com/office/drawing/2014/main" id="{7280DF53-9550-4D09-A50A-09AB7BF4EB37}"/>
+              </a:ext>
+            </a:extLst>
+          </p:cNvPr>
+          <p:cNvPicPr>
+            <a:picLocks noChangeAspect="1"/>
+          </p:cNvPicPr>
+          <p:nvPr/>
+        </p:nvPicPr>
+        <p:blipFill rotWithShape="1">
+          <a:blip r:embed="rId3">
+            <a:extLst>
+              <a:ext uri="{28A0092B-C50C-407E-A947-70E740481C1C}">
+                <a14:useLocalDpi xmlns:a14="http://schemas.microsoft.com/office/drawing/2010/main" val="0"/>
+              </a:ext>
+            </a:extLst>
+          </a:blip>
+          <a:srcRect l="3207" r="34653"/>
+          <a:stretch/>
+        </p:blipFill>
+        <p:spPr>
+          <a:xfrm>
+            <a:off x="234891" y="67113"/>
+            <a:ext cx="4311941" cy="5233922"/>
+          </a:xfrm>
+          <a:prstGeom prst="rect">
+            <a:avLst/>
+          </a:prstGeom>
+        </p:spPr>
+      </p:pic>
+      <p:sp>
+        <p:nvSpPr>
+          <p:cNvPr id="8" name="TextBox 7">
+            <a:extLst>
+              <a:ext uri="{FF2B5EF4-FFF2-40B4-BE49-F238E27FC236}">
+                <a16:creationId xmlns:a16="http://schemas.microsoft.com/office/drawing/2014/main" id="{419A917E-9E01-4243-8DC1-30852388F546}"/>
+              </a:ext>
+            </a:extLst>
+          </p:cNvPr>
+          <p:cNvSpPr txBox="1"/>
+          <p:nvPr/>
+        </p:nvSpPr>
+        <p:spPr>
+          <a:xfrm>
+            <a:off x="386968" y="5287884"/>
+            <a:ext cx="2830776" cy="369332"/>
+          </a:xfrm>
+          <a:prstGeom prst="rect">
+            <a:avLst/>
+          </a:prstGeom>
+          <a:noFill/>
+        </p:spPr>
+        <p:txBody>
+          <a:bodyPr wrap="square" rtlCol="0">
+            <a:spAutoFit/>
+          </a:bodyPr>
+          <a:lstStyle/>
+          <a:p>
+            <a:r>
+              <a:rPr lang="en-GB" dirty="0"/>
+              <a:t>DOMs for the CRUD</a:t>
+            </a:r>
+          </a:p>
+        </p:txBody>
+      </p:sp>
+      <p:sp>
+        <p:nvSpPr>
+          <p:cNvPr id="10" name="TextBox 9">
+            <a:extLst>
+              <a:ext uri="{FF2B5EF4-FFF2-40B4-BE49-F238E27FC236}">
+                <a16:creationId xmlns:a16="http://schemas.microsoft.com/office/drawing/2014/main" id="{01902DC1-540B-4D83-93EB-DE00C2D0CB31}"/>
+              </a:ext>
+            </a:extLst>
+          </p:cNvPr>
+          <p:cNvSpPr txBox="1"/>
+          <p:nvPr/>
+        </p:nvSpPr>
+        <p:spPr>
+          <a:xfrm>
+            <a:off x="5330271" y="5280088"/>
+            <a:ext cx="2830776" cy="646331"/>
+          </a:xfrm>
+          <a:prstGeom prst="rect">
+            <a:avLst/>
+          </a:prstGeom>
+          <a:noFill/>
+        </p:spPr>
+        <p:txBody>
+          <a:bodyPr wrap="square" rtlCol="0">
+            <a:spAutoFit/>
+          </a:bodyPr>
+          <a:lstStyle/>
+          <a:p>
+            <a:r>
+              <a:rPr lang="en-GB" dirty="0"/>
+              <a:t>Basic functions for usage in script.js</a:t>
+            </a:r>
+          </a:p>
+        </p:txBody>
+      </p:sp>
+    </p:spTree>
+    <p:extLst>
+      <p:ext uri="{BB962C8B-B14F-4D97-AF65-F5344CB8AC3E}">
+        <p14:creationId xmlns:p14="http://schemas.microsoft.com/office/powerpoint/2010/main" val="199234571"/>
+      </p:ext>
+    </p:extLst>
+  </p:cSld>
+  <p:clrMapOvr>
+    <a:masterClrMapping/>
+  </p:clrMapOvr>
+</p:sld>
+</file>
+
+<file path=ppt/slides/slide11.xml><?xml version="1.0" encoding="utf-8"?>
+<p:sld xmlns:a="http://schemas.openxmlformats.org/drawingml/2006/main" xmlns:r="http://schemas.openxmlformats.org/officeDocument/2006/relationships" xmlns:p="http://schemas.openxmlformats.org/presentationml/2006/main">
+  <p:cSld>
+    <p:spTree>
+      <p:nvGrpSpPr>
+        <p:cNvPr id="1" name=""/>
+        <p:cNvGrpSpPr/>
+        <p:nvPr/>
+      </p:nvGrpSpPr>
+      <p:grpSpPr>
+        <a:xfrm>
+          <a:off x="0" y="0"/>
+          <a:ext cx="0" cy="0"/>
+          <a:chOff x="0" y="0"/>
+          <a:chExt cx="0" cy="0"/>
+        </a:xfrm>
+      </p:grpSpPr>
+      <p:sp>
+        <p:nvSpPr>
+          <p:cNvPr id="2" name="Title 1">
+            <a:extLst>
+              <a:ext uri="{FF2B5EF4-FFF2-40B4-BE49-F238E27FC236}">
+                <a16:creationId xmlns:a16="http://schemas.microsoft.com/office/drawing/2014/main" id="{C9FD5E6B-0EAA-45DF-9AD6-F8006D227B75}"/>
+              </a:ext>
+            </a:extLst>
+          </p:cNvPr>
+          <p:cNvSpPr>
+            <a:spLocks noGrp="1"/>
+          </p:cNvSpPr>
+          <p:nvPr>
+            <p:ph type="title"/>
+          </p:nvPr>
+        </p:nvSpPr>
+        <p:spPr/>
+        <p:txBody>
+          <a:bodyPr/>
+          <a:lstStyle/>
+          <a:p>
+            <a:r>
+              <a:rPr lang="en-GB" dirty="0" err="1"/>
+              <a:t>javascript</a:t>
+            </a:r>
+            <a:endParaRPr lang="en-GB" dirty="0"/>
+          </a:p>
+        </p:txBody>
+      </p:sp>
+      <p:pic>
+        <p:nvPicPr>
+          <p:cNvPr id="4" name="Picture 3">
+            <a:extLst>
+              <a:ext uri="{FF2B5EF4-FFF2-40B4-BE49-F238E27FC236}">
+                <a16:creationId xmlns:a16="http://schemas.microsoft.com/office/drawing/2014/main" id="{AFFB30C1-C310-47BD-8A22-7C5A196D09B6}"/>
+              </a:ext>
+            </a:extLst>
+          </p:cNvPr>
+          <p:cNvPicPr>
+            <a:picLocks noChangeAspect="1"/>
+          </p:cNvPicPr>
+          <p:nvPr/>
+        </p:nvPicPr>
+        <p:blipFill rotWithShape="1">
+          <a:blip r:embed="rId2">
+            <a:extLst>
+              <a:ext uri="{28A0092B-C50C-407E-A947-70E740481C1C}">
+                <a14:useLocalDpi xmlns:a14="http://schemas.microsoft.com/office/drawing/2010/main" val="0"/>
+              </a:ext>
+            </a:extLst>
+          </a:blip>
+          <a:srcRect t="1" r="49210" b="41497"/>
+          <a:stretch/>
+        </p:blipFill>
+        <p:spPr>
+          <a:xfrm>
+            <a:off x="237215" y="211162"/>
+            <a:ext cx="3965669" cy="3162522"/>
+          </a:xfrm>
+          <a:prstGeom prst="rect">
+            <a:avLst/>
+          </a:prstGeom>
+        </p:spPr>
+      </p:pic>
+      <p:sp>
+        <p:nvSpPr>
+          <p:cNvPr id="5" name="TextBox 4">
+            <a:extLst>
+              <a:ext uri="{FF2B5EF4-FFF2-40B4-BE49-F238E27FC236}">
+                <a16:creationId xmlns:a16="http://schemas.microsoft.com/office/drawing/2014/main" id="{3020DC76-93A1-431D-B815-065B7370C3E1}"/>
+              </a:ext>
+            </a:extLst>
+          </p:cNvPr>
+          <p:cNvSpPr txBox="1"/>
+          <p:nvPr/>
+        </p:nvSpPr>
+        <p:spPr>
+          <a:xfrm>
+            <a:off x="237215" y="3373684"/>
+            <a:ext cx="2830776" cy="646331"/>
+          </a:xfrm>
+          <a:prstGeom prst="rect">
+            <a:avLst/>
+          </a:prstGeom>
+          <a:noFill/>
+        </p:spPr>
+        <p:txBody>
+          <a:bodyPr wrap="square" rtlCol="0">
+            <a:spAutoFit/>
+          </a:bodyPr>
+          <a:lstStyle/>
+          <a:p>
+            <a:r>
+              <a:rPr lang="en-GB" dirty="0"/>
+              <a:t>Read method, the rest are very similar</a:t>
+            </a:r>
+          </a:p>
+        </p:txBody>
+      </p:sp>
+      <p:pic>
+        <p:nvPicPr>
+          <p:cNvPr id="6" name="Picture 5">
+            <a:extLst>
+              <a:ext uri="{FF2B5EF4-FFF2-40B4-BE49-F238E27FC236}">
+                <a16:creationId xmlns:a16="http://schemas.microsoft.com/office/drawing/2014/main" id="{851FD7C5-8C8D-4B23-B23E-D88837602CA8}"/>
+              </a:ext>
+            </a:extLst>
+          </p:cNvPr>
+          <p:cNvPicPr>
+            <a:picLocks noChangeAspect="1"/>
+          </p:cNvPicPr>
+          <p:nvPr/>
+        </p:nvPicPr>
+        <p:blipFill rotWithShape="1">
+          <a:blip r:embed="rId3">
+            <a:extLst>
+              <a:ext uri="{28A0092B-C50C-407E-A947-70E740481C1C}">
+                <a14:useLocalDpi xmlns:a14="http://schemas.microsoft.com/office/drawing/2010/main" val="0"/>
+              </a:ext>
+            </a:extLst>
+          </a:blip>
+          <a:srcRect t="2574" r="52015" b="40823"/>
+          <a:stretch/>
+        </p:blipFill>
+        <p:spPr>
+          <a:xfrm>
+            <a:off x="5218382" y="212004"/>
+            <a:ext cx="4342726" cy="3180643"/>
+          </a:xfrm>
+          <a:prstGeom prst="rect">
+            <a:avLst/>
+          </a:prstGeom>
+        </p:spPr>
+      </p:pic>
+      <p:sp>
+        <p:nvSpPr>
+          <p:cNvPr id="7" name="TextBox 6">
+            <a:extLst>
+              <a:ext uri="{FF2B5EF4-FFF2-40B4-BE49-F238E27FC236}">
+                <a16:creationId xmlns:a16="http://schemas.microsoft.com/office/drawing/2014/main" id="{8A3B2B96-EED0-4FEC-B140-791D2B247777}"/>
+              </a:ext>
+            </a:extLst>
+          </p:cNvPr>
+          <p:cNvSpPr txBox="1"/>
+          <p:nvPr/>
+        </p:nvSpPr>
+        <p:spPr>
+          <a:xfrm>
+            <a:off x="5218382" y="3377029"/>
+            <a:ext cx="2830776" cy="923330"/>
+          </a:xfrm>
+          <a:prstGeom prst="rect">
+            <a:avLst/>
+          </a:prstGeom>
+          <a:noFill/>
+        </p:spPr>
+        <p:txBody>
+          <a:bodyPr wrap="square" rtlCol="0">
+            <a:spAutoFit/>
+          </a:bodyPr>
+          <a:lstStyle/>
+          <a:p>
+            <a:r>
+              <a:rPr lang="en-GB" dirty="0"/>
+              <a:t>I implemented a ‘</a:t>
+            </a:r>
+            <a:r>
+              <a:rPr lang="en-GB" dirty="0" err="1"/>
+              <a:t>darkmode</a:t>
+            </a:r>
+            <a:r>
+              <a:rPr lang="en-GB" dirty="0"/>
+              <a:t>’ feature to my CRUD page</a:t>
+            </a:r>
+          </a:p>
+        </p:txBody>
+      </p:sp>
+    </p:spTree>
+    <p:extLst>
+      <p:ext uri="{BB962C8B-B14F-4D97-AF65-F5344CB8AC3E}">
+        <p14:creationId xmlns:p14="http://schemas.microsoft.com/office/powerpoint/2010/main" val="1937946852"/>
+      </p:ext>
+    </p:extLst>
+  </p:cSld>
+  <p:clrMapOvr>
+    <a:masterClrMapping/>
+  </p:clrMapOvr>
+</p:sld>
+</file>
+
+<file path=ppt/slides/slide12.xml><?xml version="1.0" encoding="utf-8"?>
+<p:sld xmlns:a="http://schemas.openxmlformats.org/drawingml/2006/main" xmlns:r="http://schemas.openxmlformats.org/officeDocument/2006/relationships" xmlns:p="http://schemas.openxmlformats.org/presentationml/2006/main">
+  <p:cSld>
+    <p:spTree>
+      <p:nvGrpSpPr>
+        <p:cNvPr id="1" name=""/>
+        <p:cNvGrpSpPr/>
+        <p:nvPr/>
+      </p:nvGrpSpPr>
+      <p:grpSpPr>
+        <a:xfrm>
+          <a:off x="0" y="0"/>
+          <a:ext cx="0" cy="0"/>
+          <a:chOff x="0" y="0"/>
+          <a:chExt cx="0" cy="0"/>
+        </a:xfrm>
+      </p:grpSpPr>
+      <p:pic>
+        <p:nvPicPr>
+          <p:cNvPr id="5" name="Picture 4">
+            <a:extLst>
+              <a:ext uri="{FF2B5EF4-FFF2-40B4-BE49-F238E27FC236}">
+                <a16:creationId xmlns:a16="http://schemas.microsoft.com/office/drawing/2014/main" id="{95E6EAB2-8511-4A65-B571-E6D84642D19E}"/>
+              </a:ext>
+            </a:extLst>
+          </p:cNvPr>
+          <p:cNvPicPr>
+            <a:picLocks noChangeAspect="1"/>
+          </p:cNvPicPr>
+          <p:nvPr/>
+        </p:nvPicPr>
+        <p:blipFill rotWithShape="1">
+          <a:blip r:embed="rId2">
+            <a:extLst>
+              <a:ext uri="{28A0092B-C50C-407E-A947-70E740481C1C}">
+                <a14:useLocalDpi xmlns:a14="http://schemas.microsoft.com/office/drawing/2010/main" val="0"/>
+              </a:ext>
+            </a:extLst>
+          </a:blip>
+          <a:srcRect t="1346" r="41390" b="3364"/>
+          <a:stretch/>
+        </p:blipFill>
+        <p:spPr>
+          <a:xfrm>
+            <a:off x="145033" y="84667"/>
+            <a:ext cx="3648863" cy="4572001"/>
+          </a:xfrm>
+          <a:prstGeom prst="rect">
+            <a:avLst/>
+          </a:prstGeom>
+        </p:spPr>
+      </p:pic>
+      <p:sp>
+        <p:nvSpPr>
+          <p:cNvPr id="7" name="Title 6">
+            <a:extLst>
+              <a:ext uri="{FF2B5EF4-FFF2-40B4-BE49-F238E27FC236}">
+                <a16:creationId xmlns:a16="http://schemas.microsoft.com/office/drawing/2014/main" id="{17DF1498-CAAE-4ADA-B039-91908CA6AD8B}"/>
+              </a:ext>
+            </a:extLst>
+          </p:cNvPr>
+          <p:cNvSpPr>
+            <a:spLocks noGrp="1"/>
+          </p:cNvSpPr>
+          <p:nvPr>
+            <p:ph type="title"/>
+          </p:nvPr>
+        </p:nvSpPr>
+        <p:spPr/>
+        <p:txBody>
+          <a:bodyPr/>
+          <a:lstStyle/>
+          <a:p>
+            <a:r>
+              <a:rPr lang="en-GB" dirty="0"/>
+              <a:t>JAVASCRIPT FOR SECOND PAGE</a:t>
+            </a:r>
+          </a:p>
+        </p:txBody>
+      </p:sp>
+      <p:sp>
+        <p:nvSpPr>
+          <p:cNvPr id="8" name="TextBox 7">
+            <a:extLst>
+              <a:ext uri="{FF2B5EF4-FFF2-40B4-BE49-F238E27FC236}">
+                <a16:creationId xmlns:a16="http://schemas.microsoft.com/office/drawing/2014/main" id="{1B84C847-7E37-43FA-AAFC-14484CC85ED3}"/>
+              </a:ext>
+            </a:extLst>
+          </p:cNvPr>
+          <p:cNvSpPr txBox="1"/>
+          <p:nvPr/>
+        </p:nvSpPr>
+        <p:spPr>
+          <a:xfrm>
+            <a:off x="3793896" y="401936"/>
+            <a:ext cx="6922088" cy="923330"/>
+          </a:xfrm>
+          <a:prstGeom prst="rect">
+            <a:avLst/>
+          </a:prstGeom>
+          <a:noFill/>
+        </p:spPr>
+        <p:txBody>
+          <a:bodyPr wrap="none" rtlCol="0">
+            <a:spAutoFit/>
+          </a:bodyPr>
+          <a:lstStyle/>
+          <a:p>
+            <a:r>
+              <a:rPr lang="en-GB" dirty="0"/>
+              <a:t>This structure was followed throughout the script, however </a:t>
+            </a:r>
+          </a:p>
+          <a:p>
+            <a:r>
+              <a:rPr lang="en-GB" dirty="0"/>
+              <a:t>I later realised the same functionality could be achieved by </a:t>
+            </a:r>
+          </a:p>
+          <a:p>
+            <a:r>
+              <a:rPr lang="en-GB" dirty="0"/>
+              <a:t>using a different HTTP request</a:t>
+            </a:r>
+          </a:p>
+        </p:txBody>
+      </p:sp>
+    </p:spTree>
+    <p:extLst>
+      <p:ext uri="{BB962C8B-B14F-4D97-AF65-F5344CB8AC3E}">
+        <p14:creationId xmlns:p14="http://schemas.microsoft.com/office/powerpoint/2010/main" val="2724569266"/>
+      </p:ext>
+    </p:extLst>
+  </p:cSld>
+  <p:clrMapOvr>
+    <a:masterClrMapping/>
+  </p:clrMapOvr>
+</p:sld>
+</file>
+
+<file path=ppt/slides/slide13.xml><?xml version="1.0" encoding="utf-8"?>
+<p:sld xmlns:a="http://schemas.openxmlformats.org/drawingml/2006/main" xmlns:r="http://schemas.openxmlformats.org/officeDocument/2006/relationships" xmlns:p="http://schemas.openxmlformats.org/presentationml/2006/main">
+  <p:cSld>
+    <p:spTree>
+      <p:nvGrpSpPr>
+        <p:cNvPr id="1" name=""/>
+        <p:cNvGrpSpPr/>
+        <p:nvPr/>
+      </p:nvGrpSpPr>
+      <p:grpSpPr>
+        <a:xfrm>
+          <a:off x="0" y="0"/>
+          <a:ext cx="0" cy="0"/>
+          <a:chOff x="0" y="0"/>
+          <a:chExt cx="0" cy="0"/>
+        </a:xfrm>
+      </p:grpSpPr>
+      <p:sp>
+        <p:nvSpPr>
+          <p:cNvPr id="2" name="Title 1">
+            <a:extLst>
+              <a:ext uri="{FF2B5EF4-FFF2-40B4-BE49-F238E27FC236}">
+                <a16:creationId xmlns:a16="http://schemas.microsoft.com/office/drawing/2014/main" id="{605350EF-A703-4114-A8EA-C6ED76E52E88}"/>
+              </a:ext>
+            </a:extLst>
+          </p:cNvPr>
+          <p:cNvSpPr>
+            <a:spLocks noGrp="1"/>
+          </p:cNvSpPr>
+          <p:nvPr>
+            <p:ph type="title"/>
+          </p:nvPr>
+        </p:nvSpPr>
+        <p:spPr/>
+        <p:txBody>
+          <a:bodyPr/>
+          <a:lstStyle/>
+          <a:p>
+            <a:r>
+              <a:rPr lang="en-GB" dirty="0"/>
+              <a:t>testing</a:t>
+            </a:r>
+          </a:p>
+        </p:txBody>
+      </p:sp>
+      <p:pic>
+        <p:nvPicPr>
+          <p:cNvPr id="5" name="Content Placeholder 4">
+            <a:extLst>
+              <a:ext uri="{FF2B5EF4-FFF2-40B4-BE49-F238E27FC236}">
+                <a16:creationId xmlns:a16="http://schemas.microsoft.com/office/drawing/2014/main" id="{43310AD3-E9D5-4362-9815-AF5D6B22E7FE}"/>
+              </a:ext>
+            </a:extLst>
+          </p:cNvPr>
+          <p:cNvPicPr>
+            <a:picLocks noGrp="1" noChangeAspect="1"/>
+          </p:cNvPicPr>
+          <p:nvPr>
+            <p:ph idx="1"/>
+          </p:nvPr>
+        </p:nvPicPr>
+        <p:blipFill rotWithShape="1">
+          <a:blip r:embed="rId2">
+            <a:extLst>
+              <a:ext uri="{28A0092B-C50C-407E-A947-70E740481C1C}">
+                <a14:useLocalDpi xmlns:a14="http://schemas.microsoft.com/office/drawing/2010/main" val="0"/>
+              </a:ext>
+            </a:extLst>
+          </a:blip>
+          <a:srcRect t="1590" r="12909" b="3258"/>
+          <a:stretch/>
+        </p:blipFill>
+        <p:spPr>
+          <a:xfrm>
+            <a:off x="0" y="0"/>
+            <a:ext cx="6343331" cy="3598877"/>
+          </a:xfrm>
+        </p:spPr>
+      </p:pic>
+      <p:pic>
+        <p:nvPicPr>
+          <p:cNvPr id="7" name="Picture 6">
+            <a:extLst>
+              <a:ext uri="{FF2B5EF4-FFF2-40B4-BE49-F238E27FC236}">
+                <a16:creationId xmlns:a16="http://schemas.microsoft.com/office/drawing/2014/main" id="{70C38BD8-902E-4D4D-B389-FD69A4D17AC9}"/>
+              </a:ext>
+            </a:extLst>
+          </p:cNvPr>
+          <p:cNvPicPr>
+            <a:picLocks noChangeAspect="1"/>
+          </p:cNvPicPr>
+          <p:nvPr/>
+        </p:nvPicPr>
+        <p:blipFill rotWithShape="1">
+          <a:blip r:embed="rId3">
+            <a:extLst>
+              <a:ext uri="{28A0092B-C50C-407E-A947-70E740481C1C}">
+                <a14:useLocalDpi xmlns:a14="http://schemas.microsoft.com/office/drawing/2010/main" val="0"/>
+              </a:ext>
+            </a:extLst>
+          </a:blip>
+          <a:srcRect r="24705" b="33660"/>
+          <a:stretch/>
+        </p:blipFill>
+        <p:spPr>
+          <a:xfrm>
+            <a:off x="6453430" y="19877"/>
+            <a:ext cx="5651883" cy="1779561"/>
+          </a:xfrm>
+          <a:prstGeom prst="rect">
+            <a:avLst/>
+          </a:prstGeom>
+        </p:spPr>
+      </p:pic>
+      <p:pic>
+        <p:nvPicPr>
+          <p:cNvPr id="9" name="Picture 8">
+            <a:extLst>
+              <a:ext uri="{FF2B5EF4-FFF2-40B4-BE49-F238E27FC236}">
+                <a16:creationId xmlns:a16="http://schemas.microsoft.com/office/drawing/2014/main" id="{B1EB4ED0-3A9A-411D-8DD0-311749B9FD8B}"/>
+              </a:ext>
+            </a:extLst>
+          </p:cNvPr>
+          <p:cNvPicPr>
+            <a:picLocks noChangeAspect="1"/>
+          </p:cNvPicPr>
+          <p:nvPr/>
+        </p:nvPicPr>
+        <p:blipFill rotWithShape="1">
+          <a:blip r:embed="rId4">
+            <a:extLst>
+              <a:ext uri="{28A0092B-C50C-407E-A947-70E740481C1C}">
+                <a14:useLocalDpi xmlns:a14="http://schemas.microsoft.com/office/drawing/2010/main" val="0"/>
+              </a:ext>
+            </a:extLst>
+          </a:blip>
+          <a:srcRect t="41312" r="18625" b="7346"/>
+          <a:stretch/>
+        </p:blipFill>
+        <p:spPr>
+          <a:xfrm>
+            <a:off x="6482562" y="2230925"/>
+            <a:ext cx="5622751" cy="1931086"/>
+          </a:xfrm>
+          <a:prstGeom prst="rect">
+            <a:avLst/>
+          </a:prstGeom>
+        </p:spPr>
+      </p:pic>
+      <p:sp>
+        <p:nvSpPr>
+          <p:cNvPr id="10" name="TextBox 9">
+            <a:extLst>
+              <a:ext uri="{FF2B5EF4-FFF2-40B4-BE49-F238E27FC236}">
+                <a16:creationId xmlns:a16="http://schemas.microsoft.com/office/drawing/2014/main" id="{1B4EFAAB-9080-4AFC-88E4-FFAC8238CB05}"/>
+              </a:ext>
+            </a:extLst>
+          </p:cNvPr>
+          <p:cNvSpPr txBox="1"/>
+          <p:nvPr/>
+        </p:nvSpPr>
+        <p:spPr>
+          <a:xfrm>
+            <a:off x="86687" y="3598877"/>
+            <a:ext cx="2830776" cy="369332"/>
+          </a:xfrm>
+          <a:prstGeom prst="rect">
+            <a:avLst/>
+          </a:prstGeom>
+          <a:noFill/>
+        </p:spPr>
+        <p:txBody>
+          <a:bodyPr wrap="square" rtlCol="0">
+            <a:spAutoFit/>
+          </a:bodyPr>
+          <a:lstStyle/>
+          <a:p>
+            <a:r>
+              <a:rPr lang="en-GB" dirty="0"/>
+              <a:t>Integration testing</a:t>
+            </a:r>
+          </a:p>
+        </p:txBody>
+      </p:sp>
+      <p:sp>
+        <p:nvSpPr>
+          <p:cNvPr id="11" name="TextBox 10">
+            <a:extLst>
+              <a:ext uri="{FF2B5EF4-FFF2-40B4-BE49-F238E27FC236}">
+                <a16:creationId xmlns:a16="http://schemas.microsoft.com/office/drawing/2014/main" id="{A50680C2-7407-45A2-97A7-C0201BA8A4AC}"/>
+              </a:ext>
+            </a:extLst>
+          </p:cNvPr>
+          <p:cNvSpPr txBox="1"/>
+          <p:nvPr/>
+        </p:nvSpPr>
+        <p:spPr>
+          <a:xfrm>
+            <a:off x="6589552" y="1777433"/>
+            <a:ext cx="3166843" cy="369332"/>
+          </a:xfrm>
+          <a:prstGeom prst="rect">
+            <a:avLst/>
+          </a:prstGeom>
+          <a:noFill/>
+        </p:spPr>
+        <p:txBody>
+          <a:bodyPr wrap="square" rtlCol="0">
+            <a:spAutoFit/>
+          </a:bodyPr>
+          <a:lstStyle/>
+          <a:p>
+            <a:r>
+              <a:rPr lang="en-GB" dirty="0"/>
+              <a:t>Integration testing results</a:t>
+            </a:r>
+          </a:p>
+        </p:txBody>
+      </p:sp>
+      <p:sp>
+        <p:nvSpPr>
+          <p:cNvPr id="12" name="TextBox 11">
+            <a:extLst>
+              <a:ext uri="{FF2B5EF4-FFF2-40B4-BE49-F238E27FC236}">
+                <a16:creationId xmlns:a16="http://schemas.microsoft.com/office/drawing/2014/main" id="{68AC737F-99D2-492C-B4A2-29221A3D27F3}"/>
+              </a:ext>
+            </a:extLst>
+          </p:cNvPr>
+          <p:cNvSpPr txBox="1"/>
+          <p:nvPr/>
+        </p:nvSpPr>
+        <p:spPr>
+          <a:xfrm>
+            <a:off x="6482561" y="4224166"/>
+            <a:ext cx="4381181" cy="369332"/>
+          </a:xfrm>
+          <a:prstGeom prst="rect">
+            <a:avLst/>
+          </a:prstGeom>
+          <a:noFill/>
+        </p:spPr>
+        <p:txBody>
+          <a:bodyPr wrap="square" rtlCol="0">
+            <a:spAutoFit/>
+          </a:bodyPr>
+          <a:lstStyle/>
+          <a:p>
+            <a:r>
+              <a:rPr lang="en-GB" dirty="0"/>
+              <a:t>Results when unit testing was added</a:t>
+            </a:r>
+          </a:p>
+        </p:txBody>
+      </p:sp>
+    </p:spTree>
+    <p:extLst>
+      <p:ext uri="{BB962C8B-B14F-4D97-AF65-F5344CB8AC3E}">
+        <p14:creationId xmlns:p14="http://schemas.microsoft.com/office/powerpoint/2010/main" val="1128193384"/>
+      </p:ext>
+    </p:extLst>
+  </p:cSld>
+  <p:clrMapOvr>
+    <a:masterClrMapping/>
+  </p:clrMapOvr>
+</p:sld>
+</file>
+
+<file path=ppt/slides/slide14.xml><?xml version="1.0" encoding="utf-8"?>
+<p:sld xmlns:a="http://schemas.openxmlformats.org/drawingml/2006/main" xmlns:r="http://schemas.openxmlformats.org/officeDocument/2006/relationships" xmlns:p="http://schemas.openxmlformats.org/presentationml/2006/main">
+  <p:cSld>
+    <p:spTree>
+      <p:nvGrpSpPr>
+        <p:cNvPr id="1" name=""/>
+        <p:cNvGrpSpPr/>
+        <p:nvPr/>
+      </p:nvGrpSpPr>
+      <p:grpSpPr>
+        <a:xfrm>
+          <a:off x="0" y="0"/>
+          <a:ext cx="0" cy="0"/>
+          <a:chOff x="0" y="0"/>
+          <a:chExt cx="0" cy="0"/>
+        </a:xfrm>
+      </p:grpSpPr>
+      <p:sp>
+        <p:nvSpPr>
+          <p:cNvPr id="2" name="Title 1">
+            <a:extLst>
+              <a:ext uri="{FF2B5EF4-FFF2-40B4-BE49-F238E27FC236}">
                 <a16:creationId xmlns:a16="http://schemas.microsoft.com/office/drawing/2014/main" id="{5E94A228-A697-48E7-83DA-BECA2E296E2C}"/>
               </a:ext>
             </a:extLst>
@@ -5507,7 +6333,25 @@
           <a:bodyPr/>
           <a:lstStyle/>
           <a:p>
-            <a:endParaRPr lang="en-GB"/>
+            <a:r>
+              <a:rPr lang="en-GB" dirty="0"/>
+              <a:t>What went well – generally really enjoyed the project and feel that the majority of the project went well despite a few small hiccups</a:t>
+            </a:r>
+          </a:p>
+          <a:p>
+            <a:r>
+              <a:rPr lang="en-GB" dirty="0"/>
+              <a:t>What went bad – chrome compatibility and problems with naming additional functions in the repository</a:t>
+            </a:r>
+          </a:p>
+          <a:p>
+            <a:r>
+              <a:rPr lang="en-GB" dirty="0"/>
+              <a:t>What would I change – add some animation to the front end of the application, possibly additional methods for the CRUD such as delete-all which was planned</a:t>
+            </a:r>
+          </a:p>
+          <a:p>
+            <a:endParaRPr lang="en-GB" dirty="0"/>
           </a:p>
         </p:txBody>
       </p:sp>
@@ -5590,6 +6434,54 @@
           <a:bodyPr/>
           <a:lstStyle/>
           <a:p>
+            <a:pPr marL="0" indent="0">
+              <a:buNone/>
+            </a:pPr>
+            <a:r>
+              <a:rPr lang="en-GB" dirty="0"/>
+              <a:t>I will be:</a:t>
+            </a:r>
+          </a:p>
+          <a:p>
+            <a:r>
+              <a:rPr lang="en-GB" dirty="0"/>
+              <a:t>showing you how the project was planned</a:t>
+            </a:r>
+          </a:p>
+          <a:p>
+            <a:r>
+              <a:rPr lang="en-GB" dirty="0"/>
+              <a:t>walking you through the back-end and front-end of the application showing you how it was done</a:t>
+            </a:r>
+          </a:p>
+          <a:p>
+            <a:r>
+              <a:rPr lang="en-GB" dirty="0"/>
+              <a:t>explaining the testing with results</a:t>
+            </a:r>
+          </a:p>
+          <a:p>
+            <a:r>
+              <a:rPr lang="en-GB" dirty="0"/>
+              <a:t>Giving a summary for the project</a:t>
+            </a:r>
+          </a:p>
+          <a:p>
+            <a:r>
+              <a:rPr lang="en-GB" dirty="0"/>
+              <a:t>Demonstrating a demo of the application</a:t>
+            </a:r>
+          </a:p>
+          <a:p>
+            <a:r>
+              <a:rPr lang="en-GB" dirty="0"/>
+              <a:t>Taking questions at the end</a:t>
+            </a:r>
+          </a:p>
+          <a:p>
+            <a:endParaRPr lang="en-GB" dirty="0"/>
+          </a:p>
+          <a:p>
             <a:endParaRPr lang="en-GB" dirty="0"/>
           </a:p>
         </p:txBody>
@@ -5640,7 +6532,12 @@
             <p:ph type="title"/>
           </p:nvPr>
         </p:nvSpPr>
-        <p:spPr/>
+        <p:spPr>
+          <a:xfrm>
+            <a:off x="0" y="5350933"/>
+            <a:ext cx="8534400" cy="1507067"/>
+          </a:xfrm>
+        </p:spPr>
         <p:txBody>
           <a:bodyPr/>
           <a:lstStyle/>
@@ -5652,28 +6549,150 @@
           </a:p>
         </p:txBody>
       </p:sp>
-      <p:sp>
-        <p:nvSpPr>
-          <p:cNvPr id="3" name="Content Placeholder 2">
+      <p:pic>
+        <p:nvPicPr>
+          <p:cNvPr id="5" name="Content Placeholder 4">
             <a:extLst>
               <a:ext uri="{FF2B5EF4-FFF2-40B4-BE49-F238E27FC236}">
-                <a16:creationId xmlns:a16="http://schemas.microsoft.com/office/drawing/2014/main" id="{16F723F5-1921-467E-9A97-301EDCCB4106}"/>
+                <a16:creationId xmlns:a16="http://schemas.microsoft.com/office/drawing/2014/main" id="{5BB2BD08-55F2-4800-9F73-DEB16BB9C6FF}"/>
               </a:ext>
             </a:extLst>
           </p:cNvPr>
-          <p:cNvSpPr>
-            <a:spLocks noGrp="1"/>
-          </p:cNvSpPr>
+          <p:cNvPicPr>
+            <a:picLocks noGrp="1" noChangeAspect="1"/>
+          </p:cNvPicPr>
           <p:nvPr>
             <p:ph idx="1"/>
           </p:nvPr>
-        </p:nvSpPr>
-        <p:spPr/>
-        <p:txBody>
-          <a:bodyPr/>
-          <a:lstStyle/>
-          <a:p>
-            <a:endParaRPr lang="en-GB"/>
+        </p:nvPicPr>
+        <p:blipFill rotWithShape="1">
+          <a:blip r:embed="rId2">
+            <a:extLst>
+              <a:ext uri="{28A0092B-C50C-407E-A947-70E740481C1C}">
+                <a14:useLocalDpi xmlns:a14="http://schemas.microsoft.com/office/drawing/2010/main" val="0"/>
+              </a:ext>
+            </a:extLst>
+          </a:blip>
+          <a:srcRect l="4380" r="20666"/>
+          <a:stretch/>
+        </p:blipFill>
+        <p:spPr>
+          <a:xfrm>
+            <a:off x="189816" y="170982"/>
+            <a:ext cx="4992612" cy="3696341"/>
+          </a:xfrm>
+        </p:spPr>
+      </p:pic>
+      <p:pic>
+        <p:nvPicPr>
+          <p:cNvPr id="9" name="Picture 8">
+            <a:extLst>
+              <a:ext uri="{FF2B5EF4-FFF2-40B4-BE49-F238E27FC236}">
+                <a16:creationId xmlns:a16="http://schemas.microsoft.com/office/drawing/2014/main" id="{AB5B68E6-23B4-4B13-95BD-73E24D7B540F}"/>
+              </a:ext>
+            </a:extLst>
+          </p:cNvPr>
+          <p:cNvPicPr>
+            <a:picLocks noChangeAspect="1"/>
+          </p:cNvPicPr>
+          <p:nvPr/>
+        </p:nvPicPr>
+        <p:blipFill rotWithShape="1">
+          <a:blip r:embed="rId3">
+            <a:extLst>
+              <a:ext uri="{28A0092B-C50C-407E-A947-70E740481C1C}">
+                <a14:useLocalDpi xmlns:a14="http://schemas.microsoft.com/office/drawing/2010/main" val="0"/>
+              </a:ext>
+            </a:extLst>
+          </a:blip>
+          <a:srcRect t="1995" r="8915" b="2606"/>
+          <a:stretch/>
+        </p:blipFill>
+        <p:spPr>
+          <a:xfrm>
+            <a:off x="6028375" y="170981"/>
+            <a:ext cx="4547459" cy="3696342"/>
+          </a:xfrm>
+          <a:prstGeom prst="rect">
+            <a:avLst/>
+          </a:prstGeom>
+        </p:spPr>
+      </p:pic>
+      <p:sp>
+        <p:nvSpPr>
+          <p:cNvPr id="10" name="TextBox 9">
+            <a:extLst>
+              <a:ext uri="{FF2B5EF4-FFF2-40B4-BE49-F238E27FC236}">
+                <a16:creationId xmlns:a16="http://schemas.microsoft.com/office/drawing/2014/main" id="{2C2BA08C-4F1C-43FB-847E-C3F472B9F292}"/>
+              </a:ext>
+            </a:extLst>
+          </p:cNvPr>
+          <p:cNvSpPr txBox="1"/>
+          <p:nvPr/>
+        </p:nvSpPr>
+        <p:spPr>
+          <a:xfrm>
+            <a:off x="189816" y="3867323"/>
+            <a:ext cx="5212694" cy="646331"/>
+          </a:xfrm>
+          <a:prstGeom prst="rect">
+            <a:avLst/>
+          </a:prstGeom>
+          <a:noFill/>
+        </p:spPr>
+        <p:txBody>
+          <a:bodyPr wrap="square" rtlCol="0">
+            <a:spAutoFit/>
+          </a:bodyPr>
+          <a:lstStyle/>
+          <a:p>
+            <a:r>
+              <a:rPr lang="en-GB" dirty="0"/>
+              <a:t>I used Jira to plan my project, splitting my work into 5 epics, 15 user stories and 20 tasks</a:t>
+            </a:r>
+          </a:p>
+        </p:txBody>
+      </p:sp>
+      <p:sp>
+        <p:nvSpPr>
+          <p:cNvPr id="11" name="TextBox 10">
+            <a:extLst>
+              <a:ext uri="{FF2B5EF4-FFF2-40B4-BE49-F238E27FC236}">
+                <a16:creationId xmlns:a16="http://schemas.microsoft.com/office/drawing/2014/main" id="{90830B2A-0F1D-4F56-823C-8E1F343646E8}"/>
+              </a:ext>
+            </a:extLst>
+          </p:cNvPr>
+          <p:cNvSpPr txBox="1"/>
+          <p:nvPr/>
+        </p:nvSpPr>
+        <p:spPr>
+          <a:xfrm>
+            <a:off x="6028375" y="3867322"/>
+            <a:ext cx="4625643" cy="923330"/>
+          </a:xfrm>
+          <a:prstGeom prst="rect">
+            <a:avLst/>
+          </a:prstGeom>
+          <a:noFill/>
+        </p:spPr>
+        <p:txBody>
+          <a:bodyPr wrap="square" rtlCol="0">
+            <a:spAutoFit/>
+          </a:bodyPr>
+          <a:lstStyle/>
+          <a:p>
+            <a:r>
+              <a:rPr lang="en-GB" dirty="0"/>
+              <a:t>I used </a:t>
+            </a:r>
+            <a:r>
+              <a:rPr lang="en-GB" dirty="0" err="1"/>
+              <a:t>MosCow</a:t>
+            </a:r>
+            <a:r>
+              <a:rPr lang="en-GB" dirty="0"/>
+              <a:t>, prioritisation, story points as well as acceptance criteria where applicable</a:t>
+            </a:r>
           </a:p>
         </p:txBody>
       </p:sp>
@@ -5712,7 +6731,7 @@
           <p:cNvPr id="2" name="Title 1">
             <a:extLst>
               <a:ext uri="{FF2B5EF4-FFF2-40B4-BE49-F238E27FC236}">
-                <a16:creationId xmlns:a16="http://schemas.microsoft.com/office/drawing/2014/main" id="{2BA070AB-233A-45C3-B0C9-F5A9D403BC29}"/>
+                <a16:creationId xmlns:a16="http://schemas.microsoft.com/office/drawing/2014/main" id="{B4C9087B-9838-421E-BC4F-809B1F561F34}"/>
               </a:ext>
             </a:extLst>
           </p:cNvPr>
@@ -5723,47 +6742,167 @@
             <p:ph type="title"/>
           </p:nvPr>
         </p:nvSpPr>
-        <p:spPr/>
+        <p:spPr>
+          <a:xfrm>
+            <a:off x="0" y="5350933"/>
+            <a:ext cx="8534400" cy="1507067"/>
+          </a:xfrm>
+        </p:spPr>
         <p:txBody>
           <a:bodyPr/>
           <a:lstStyle/>
           <a:p>
             <a:r>
               <a:rPr lang="en-GB" dirty="0"/>
-              <a:t>Spring</a:t>
-            </a:r>
-          </a:p>
-        </p:txBody>
-      </p:sp>
-      <p:sp>
-        <p:nvSpPr>
-          <p:cNvPr id="3" name="Content Placeholder 2">
+              <a:t>Version control</a:t>
+            </a:r>
+          </a:p>
+        </p:txBody>
+      </p:sp>
+      <p:pic>
+        <p:nvPicPr>
+          <p:cNvPr id="5" name="Picture 4">
             <a:extLst>
               <a:ext uri="{FF2B5EF4-FFF2-40B4-BE49-F238E27FC236}">
-                <a16:creationId xmlns:a16="http://schemas.microsoft.com/office/drawing/2014/main" id="{960D922C-0849-442B-BC90-CD40BC28D0A3}"/>
+                <a16:creationId xmlns:a16="http://schemas.microsoft.com/office/drawing/2014/main" id="{C8DAF0EA-57F3-40CB-BD21-4DC42C792535}"/>
               </a:ext>
             </a:extLst>
           </p:cNvPr>
-          <p:cNvSpPr>
-            <a:spLocks noGrp="1"/>
-          </p:cNvSpPr>
-          <p:nvPr>
-            <p:ph idx="1"/>
-          </p:nvPr>
-        </p:nvSpPr>
-        <p:spPr/>
-        <p:txBody>
-          <a:bodyPr/>
-          <a:lstStyle/>
-          <a:p>
-            <a:endParaRPr lang="en-GB"/>
+          <p:cNvPicPr>
+            <a:picLocks noChangeAspect="1"/>
+          </p:cNvPicPr>
+          <p:nvPr/>
+        </p:nvPicPr>
+        <p:blipFill rotWithShape="1">
+          <a:blip r:embed="rId2">
+            <a:extLst>
+              <a:ext uri="{28A0092B-C50C-407E-A947-70E740481C1C}">
+                <a14:useLocalDpi xmlns:a14="http://schemas.microsoft.com/office/drawing/2010/main" val="0"/>
+              </a:ext>
+            </a:extLst>
+          </a:blip>
+          <a:srcRect l="9582" r="12814"/>
+          <a:stretch/>
+        </p:blipFill>
+        <p:spPr>
+          <a:xfrm>
+            <a:off x="239282" y="121446"/>
+            <a:ext cx="6208527" cy="4288833"/>
+          </a:xfrm>
+          <a:prstGeom prst="rect">
+            <a:avLst/>
+          </a:prstGeom>
+        </p:spPr>
+      </p:pic>
+      <p:sp>
+        <p:nvSpPr>
+          <p:cNvPr id="6" name="TextBox 5">
+            <a:extLst>
+              <a:ext uri="{FF2B5EF4-FFF2-40B4-BE49-F238E27FC236}">
+                <a16:creationId xmlns:a16="http://schemas.microsoft.com/office/drawing/2014/main" id="{E668816B-2270-42EA-8F00-2F8E0113F0F8}"/>
+              </a:ext>
+            </a:extLst>
+          </p:cNvPr>
+          <p:cNvSpPr txBox="1"/>
+          <p:nvPr/>
+        </p:nvSpPr>
+        <p:spPr>
+          <a:xfrm>
+            <a:off x="239282" y="4374666"/>
+            <a:ext cx="6208526" cy="646331"/>
+          </a:xfrm>
+          <a:prstGeom prst="rect">
+            <a:avLst/>
+          </a:prstGeom>
+          <a:noFill/>
+        </p:spPr>
+        <p:txBody>
+          <a:bodyPr wrap="square" rtlCol="0">
+            <a:spAutoFit/>
+          </a:bodyPr>
+          <a:lstStyle/>
+          <a:p>
+            <a:r>
+              <a:rPr lang="en-GB" dirty="0"/>
+              <a:t>I used GitHub for my version control, and overall I used 10 different branches (8 features)</a:t>
+            </a:r>
+          </a:p>
+        </p:txBody>
+      </p:sp>
+      <p:pic>
+        <p:nvPicPr>
+          <p:cNvPr id="7" name="Picture 6">
+            <a:extLst>
+              <a:ext uri="{FF2B5EF4-FFF2-40B4-BE49-F238E27FC236}">
+                <a16:creationId xmlns:a16="http://schemas.microsoft.com/office/drawing/2014/main" id="{96EF8EAB-5661-445C-AC40-CD4C176D80FF}"/>
+              </a:ext>
+            </a:extLst>
+          </p:cNvPr>
+          <p:cNvPicPr>
+            <a:picLocks noChangeAspect="1"/>
+          </p:cNvPicPr>
+          <p:nvPr/>
+        </p:nvPicPr>
+        <p:blipFill rotWithShape="1">
+          <a:blip r:embed="rId3">
+            <a:extLst>
+              <a:ext uri="{28A0092B-C50C-407E-A947-70E740481C1C}">
+                <a14:useLocalDpi xmlns:a14="http://schemas.microsoft.com/office/drawing/2010/main" val="0"/>
+              </a:ext>
+            </a:extLst>
+          </a:blip>
+          <a:srcRect l="2090" t="33139" r="37246" b="5023"/>
+          <a:stretch/>
+        </p:blipFill>
+        <p:spPr>
+          <a:xfrm>
+            <a:off x="6722692" y="121446"/>
+            <a:ext cx="5230026" cy="3204672"/>
+          </a:xfrm>
+          <a:prstGeom prst="rect">
+            <a:avLst/>
+          </a:prstGeom>
+        </p:spPr>
+      </p:pic>
+      <p:sp>
+        <p:nvSpPr>
+          <p:cNvPr id="8" name="TextBox 7">
+            <a:extLst>
+              <a:ext uri="{FF2B5EF4-FFF2-40B4-BE49-F238E27FC236}">
+                <a16:creationId xmlns:a16="http://schemas.microsoft.com/office/drawing/2014/main" id="{5C5BB269-B928-454C-8C39-1278027709F2}"/>
+              </a:ext>
+            </a:extLst>
+          </p:cNvPr>
+          <p:cNvSpPr txBox="1"/>
+          <p:nvPr/>
+        </p:nvSpPr>
+        <p:spPr>
+          <a:xfrm>
+            <a:off x="6722692" y="3343442"/>
+            <a:ext cx="4712998" cy="1200329"/>
+          </a:xfrm>
+          <a:prstGeom prst="rect">
+            <a:avLst/>
+          </a:prstGeom>
+          <a:noFill/>
+        </p:spPr>
+        <p:txBody>
+          <a:bodyPr wrap="square" rtlCol="0">
+            <a:spAutoFit/>
+          </a:bodyPr>
+          <a:lstStyle/>
+          <a:p>
+            <a:r>
+              <a:rPr lang="en-GB" dirty="0"/>
+              <a:t>I linked my GitHub with my Jira board, and with this made every commit a smart-commit which automatically comments on my Jira</a:t>
+            </a:r>
           </a:p>
         </p:txBody>
       </p:sp>
     </p:spTree>
     <p:extLst>
       <p:ext uri="{BB962C8B-B14F-4D97-AF65-F5344CB8AC3E}">
-        <p14:creationId xmlns:p14="http://schemas.microsoft.com/office/powerpoint/2010/main" val="3532778452"/>
+        <p14:creationId xmlns:p14="http://schemas.microsoft.com/office/powerpoint/2010/main" val="1520840999"/>
       </p:ext>
     </p:extLst>
   </p:cSld>
@@ -5795,7 +6934,7 @@
           <p:cNvPr id="2" name="Title 1">
             <a:extLst>
               <a:ext uri="{FF2B5EF4-FFF2-40B4-BE49-F238E27FC236}">
-                <a16:creationId xmlns:a16="http://schemas.microsoft.com/office/drawing/2014/main" id="{D8156999-3B3B-4010-869F-FF36212D2245}"/>
+                <a16:creationId xmlns:a16="http://schemas.microsoft.com/office/drawing/2014/main" id="{2BA070AB-233A-45C3-B0C9-F5A9D403BC29}"/>
               </a:ext>
             </a:extLst>
           </p:cNvPr>
@@ -5806,38 +6945,31 @@
             <p:ph type="title"/>
           </p:nvPr>
         </p:nvSpPr>
-        <p:spPr>
-          <a:xfrm>
-            <a:off x="700990" y="4447560"/>
-            <a:ext cx="8534400" cy="1507067"/>
-          </a:xfrm>
-        </p:spPr>
+        <p:spPr/>
         <p:txBody>
           <a:bodyPr/>
           <a:lstStyle/>
           <a:p>
             <a:r>
               <a:rPr lang="en-GB" dirty="0"/>
-              <a:t>Java</a:t>
+              <a:t>Spring</a:t>
             </a:r>
           </a:p>
         </p:txBody>
       </p:sp>
       <p:pic>
         <p:nvPicPr>
-          <p:cNvPr id="5" name="Content Placeholder 4">
+          <p:cNvPr id="5" name="Picture 4">
             <a:extLst>
               <a:ext uri="{FF2B5EF4-FFF2-40B4-BE49-F238E27FC236}">
-                <a16:creationId xmlns:a16="http://schemas.microsoft.com/office/drawing/2014/main" id="{9B8D04C2-DF0C-4F88-B871-0BFCCC6F18B4}"/>
+                <a16:creationId xmlns:a16="http://schemas.microsoft.com/office/drawing/2014/main" id="{B865FDB9-400C-4917-BE2C-875115494656}"/>
               </a:ext>
             </a:extLst>
           </p:cNvPr>
           <p:cNvPicPr>
-            <a:picLocks noGrp="1" noChangeAspect="1"/>
+            <a:picLocks noChangeAspect="1"/>
           </p:cNvPicPr>
-          <p:nvPr>
-            <p:ph idx="1"/>
-          </p:nvPr>
+          <p:nvPr/>
         </p:nvPicPr>
         <p:blipFill rotWithShape="1">
           <a:blip r:embed="rId2">
@@ -5847,127 +6979,25 @@
               </a:ext>
             </a:extLst>
           </a:blip>
-          <a:srcRect t="31368" b="23541"/>
+          <a:srcRect b="46365"/>
           <a:stretch/>
         </p:blipFill>
         <p:spPr>
           <a:xfrm>
-            <a:off x="4875567" y="5058061"/>
-            <a:ext cx="7204082" cy="1728331"/>
-          </a:xfrm>
-        </p:spPr>
-      </p:pic>
-      <p:pic>
-        <p:nvPicPr>
-          <p:cNvPr id="7" name="Picture 6">
-            <a:extLst>
-              <a:ext uri="{FF2B5EF4-FFF2-40B4-BE49-F238E27FC236}">
-                <a16:creationId xmlns:a16="http://schemas.microsoft.com/office/drawing/2014/main" id="{BBD9309C-1C5D-4EE9-A663-A487F075C9BF}"/>
-              </a:ext>
-            </a:extLst>
-          </p:cNvPr>
-          <p:cNvPicPr>
-            <a:picLocks noChangeAspect="1"/>
-          </p:cNvPicPr>
-          <p:nvPr/>
-        </p:nvPicPr>
-        <p:blipFill rotWithShape="1">
-          <a:blip r:embed="rId3">
-            <a:extLst>
-              <a:ext uri="{28A0092B-C50C-407E-A947-70E740481C1C}">
-                <a14:useLocalDpi xmlns:a14="http://schemas.microsoft.com/office/drawing/2010/main" val="0"/>
-              </a:ext>
-            </a:extLst>
-          </a:blip>
-          <a:srcRect r="19762"/>
-          <a:stretch/>
-        </p:blipFill>
-        <p:spPr>
-          <a:xfrm>
-            <a:off x="0" y="0"/>
-            <a:ext cx="5025006" cy="3861104"/>
+            <a:off x="3560398" y="170569"/>
+            <a:ext cx="5071204" cy="4224484"/>
           </a:xfrm>
           <a:prstGeom prst="rect">
             <a:avLst/>
           </a:prstGeom>
         </p:spPr>
       </p:pic>
-      <p:pic>
-        <p:nvPicPr>
-          <p:cNvPr id="9" name="Picture 8">
+      <p:sp>
+        <p:nvSpPr>
+          <p:cNvPr id="7" name="TextBox 6">
             <a:extLst>
               <a:ext uri="{FF2B5EF4-FFF2-40B4-BE49-F238E27FC236}">
-                <a16:creationId xmlns:a16="http://schemas.microsoft.com/office/drawing/2014/main" id="{8A3D177F-D083-4F00-A455-B45D27A19255}"/>
-              </a:ext>
-            </a:extLst>
-          </p:cNvPr>
-          <p:cNvPicPr>
-            <a:picLocks noChangeAspect="1"/>
-          </p:cNvPicPr>
-          <p:nvPr/>
-        </p:nvPicPr>
-        <p:blipFill rotWithShape="1">
-          <a:blip r:embed="rId4">
-            <a:extLst>
-              <a:ext uri="{28A0092B-C50C-407E-A947-70E740481C1C}">
-                <a14:useLocalDpi xmlns:a14="http://schemas.microsoft.com/office/drawing/2010/main" val="0"/>
-              </a:ext>
-            </a:extLst>
-          </a:blip>
-          <a:srcRect l="110" t="9928" r="44129" b="3960"/>
-          <a:stretch/>
-        </p:blipFill>
-        <p:spPr>
-          <a:xfrm>
-            <a:off x="5108896" y="0"/>
-            <a:ext cx="3368712" cy="3349003"/>
-          </a:xfrm>
-          <a:prstGeom prst="rect">
-            <a:avLst/>
-          </a:prstGeom>
-        </p:spPr>
-      </p:pic>
-      <p:pic>
-        <p:nvPicPr>
-          <p:cNvPr id="11" name="Picture 10">
-            <a:extLst>
-              <a:ext uri="{FF2B5EF4-FFF2-40B4-BE49-F238E27FC236}">
-                <a16:creationId xmlns:a16="http://schemas.microsoft.com/office/drawing/2014/main" id="{D7012D46-AAD1-4399-94A4-34D4475D0449}"/>
-              </a:ext>
-            </a:extLst>
-          </p:cNvPr>
-          <p:cNvPicPr>
-            <a:picLocks noChangeAspect="1"/>
-          </p:cNvPicPr>
-          <p:nvPr/>
-        </p:nvPicPr>
-        <p:blipFill rotWithShape="1">
-          <a:blip r:embed="rId5">
-            <a:extLst>
-              <a:ext uri="{28A0092B-C50C-407E-A947-70E740481C1C}">
-                <a14:useLocalDpi xmlns:a14="http://schemas.microsoft.com/office/drawing/2010/main" val="0"/>
-              </a:ext>
-            </a:extLst>
-          </a:blip>
-          <a:srcRect r="50904" b="15026"/>
-          <a:stretch/>
-        </p:blipFill>
-        <p:spPr>
-          <a:xfrm>
-            <a:off x="8627048" y="0"/>
-            <a:ext cx="3530148" cy="4823670"/>
-          </a:xfrm>
-          <a:prstGeom prst="rect">
-            <a:avLst/>
-          </a:prstGeom>
-        </p:spPr>
-      </p:pic>
-      <p:sp>
-        <p:nvSpPr>
-          <p:cNvPr id="12" name="TextBox 11">
-            <a:extLst>
-              <a:ext uri="{FF2B5EF4-FFF2-40B4-BE49-F238E27FC236}">
-                <a16:creationId xmlns:a16="http://schemas.microsoft.com/office/drawing/2014/main" id="{4A7D9110-81A2-4855-94E4-15A83A01540B}"/>
+                <a16:creationId xmlns:a16="http://schemas.microsoft.com/office/drawing/2014/main" id="{DF181AB7-31EF-4540-9C5E-0E16F905E00B}"/>
               </a:ext>
             </a:extLst>
           </p:cNvPr>
@@ -5976,8 +7006,8 @@
         </p:nvSpPr>
         <p:spPr>
           <a:xfrm>
-            <a:off x="125834" y="3861104"/>
-            <a:ext cx="2830776" cy="369332"/>
+            <a:off x="3560398" y="4395053"/>
+            <a:ext cx="5071204" cy="646331"/>
           </a:xfrm>
           <a:prstGeom prst="rect">
             <a:avLst/>
@@ -5992,112 +7022,7 @@
           <a:p>
             <a:r>
               <a:rPr lang="en-GB" dirty="0"/>
-              <a:t>This is my controller</a:t>
-            </a:r>
-          </a:p>
-        </p:txBody>
-      </p:sp>
-      <p:sp>
-        <p:nvSpPr>
-          <p:cNvPr id="13" name="TextBox 12">
-            <a:extLst>
-              <a:ext uri="{FF2B5EF4-FFF2-40B4-BE49-F238E27FC236}">
-                <a16:creationId xmlns:a16="http://schemas.microsoft.com/office/drawing/2014/main" id="{BD17315C-7870-466D-A6E1-D5CBE32096C1}"/>
-              </a:ext>
-            </a:extLst>
-          </p:cNvPr>
-          <p:cNvSpPr txBox="1"/>
-          <p:nvPr/>
-        </p:nvSpPr>
-        <p:spPr>
-          <a:xfrm>
-            <a:off x="9176852" y="4756200"/>
-            <a:ext cx="2550957" cy="369332"/>
-          </a:xfrm>
-          <a:prstGeom prst="rect">
-            <a:avLst/>
-          </a:prstGeom>
-          <a:noFill/>
-        </p:spPr>
-        <p:txBody>
-          <a:bodyPr wrap="square" rtlCol="0">
-            <a:spAutoFit/>
-          </a:bodyPr>
-          <a:lstStyle/>
-          <a:p>
-            <a:r>
-              <a:rPr lang="en-GB" dirty="0"/>
-              <a:t>This is my service</a:t>
-            </a:r>
-          </a:p>
-        </p:txBody>
-      </p:sp>
-      <p:sp>
-        <p:nvSpPr>
-          <p:cNvPr id="14" name="TextBox 13">
-            <a:extLst>
-              <a:ext uri="{FF2B5EF4-FFF2-40B4-BE49-F238E27FC236}">
-                <a16:creationId xmlns:a16="http://schemas.microsoft.com/office/drawing/2014/main" id="{9A2B3F19-C4F6-4114-8F57-2A7A47A16340}"/>
-              </a:ext>
-            </a:extLst>
-          </p:cNvPr>
-          <p:cNvSpPr txBox="1"/>
-          <p:nvPr/>
-        </p:nvSpPr>
-        <p:spPr>
-          <a:xfrm>
-            <a:off x="5489195" y="3395553"/>
-            <a:ext cx="1971413" cy="646331"/>
-          </a:xfrm>
-          <a:prstGeom prst="rect">
-            <a:avLst/>
-          </a:prstGeom>
-          <a:noFill/>
-        </p:spPr>
-        <p:txBody>
-          <a:bodyPr wrap="square" rtlCol="0">
-            <a:spAutoFit/>
-          </a:bodyPr>
-          <a:lstStyle/>
-          <a:p>
-            <a:r>
-              <a:rPr lang="en-GB" dirty="0"/>
-              <a:t>This is my domain</a:t>
-            </a:r>
-          </a:p>
-        </p:txBody>
-      </p:sp>
-      <p:sp>
-        <p:nvSpPr>
-          <p:cNvPr id="15" name="TextBox 14">
-            <a:extLst>
-              <a:ext uri="{FF2B5EF4-FFF2-40B4-BE49-F238E27FC236}">
-                <a16:creationId xmlns:a16="http://schemas.microsoft.com/office/drawing/2014/main" id="{5C456313-A194-4878-88DE-85434631F5B7}"/>
-              </a:ext>
-            </a:extLst>
-          </p:cNvPr>
-          <p:cNvSpPr txBox="1"/>
-          <p:nvPr/>
-        </p:nvSpPr>
-        <p:spPr>
-          <a:xfrm>
-            <a:off x="3644125" y="4688729"/>
-            <a:ext cx="2830776" cy="369332"/>
-          </a:xfrm>
-          <a:prstGeom prst="rect">
-            <a:avLst/>
-          </a:prstGeom>
-          <a:noFill/>
-        </p:spPr>
-        <p:txBody>
-          <a:bodyPr wrap="square" rtlCol="0">
-            <a:spAutoFit/>
-          </a:bodyPr>
-          <a:lstStyle/>
-          <a:p>
-            <a:r>
-              <a:rPr lang="en-GB" dirty="0"/>
-              <a:t>This is my repository</a:t>
+              <a:t>Spring was used to create a REST API for the application</a:t>
             </a:r>
           </a:p>
         </p:txBody>
@@ -6105,7 +7030,7 @@
     </p:spTree>
     <p:extLst>
       <p:ext uri="{BB962C8B-B14F-4D97-AF65-F5344CB8AC3E}">
-        <p14:creationId xmlns:p14="http://schemas.microsoft.com/office/powerpoint/2010/main" val="1197551674"/>
+        <p14:creationId xmlns:p14="http://schemas.microsoft.com/office/powerpoint/2010/main" val="3532778452"/>
       </p:ext>
     </p:extLst>
   </p:cSld>
@@ -6137,6 +7062,476 @@
           <p:cNvPr id="2" name="Title 1">
             <a:extLst>
               <a:ext uri="{FF2B5EF4-FFF2-40B4-BE49-F238E27FC236}">
+                <a16:creationId xmlns:a16="http://schemas.microsoft.com/office/drawing/2014/main" id="{D8156999-3B3B-4010-869F-FF36212D2245}"/>
+              </a:ext>
+            </a:extLst>
+          </p:cNvPr>
+          <p:cNvSpPr>
+            <a:spLocks noGrp="1"/>
+          </p:cNvSpPr>
+          <p:nvPr>
+            <p:ph type="title"/>
+          </p:nvPr>
+        </p:nvSpPr>
+        <p:spPr>
+          <a:xfrm>
+            <a:off x="180872" y="5198747"/>
+            <a:ext cx="8534400" cy="1507067"/>
+          </a:xfrm>
+        </p:spPr>
+        <p:txBody>
+          <a:bodyPr/>
+          <a:lstStyle/>
+          <a:p>
+            <a:r>
+              <a:rPr lang="en-GB" dirty="0"/>
+              <a:t>Java</a:t>
+            </a:r>
+          </a:p>
+        </p:txBody>
+      </p:sp>
+      <p:pic>
+        <p:nvPicPr>
+          <p:cNvPr id="9" name="Picture 8">
+            <a:extLst>
+              <a:ext uri="{FF2B5EF4-FFF2-40B4-BE49-F238E27FC236}">
+                <a16:creationId xmlns:a16="http://schemas.microsoft.com/office/drawing/2014/main" id="{8A3D177F-D083-4F00-A455-B45D27A19255}"/>
+              </a:ext>
+            </a:extLst>
+          </p:cNvPr>
+          <p:cNvPicPr>
+            <a:picLocks noChangeAspect="1"/>
+          </p:cNvPicPr>
+          <p:nvPr/>
+        </p:nvPicPr>
+        <p:blipFill rotWithShape="1">
+          <a:blip r:embed="rId2">
+            <a:extLst>
+              <a:ext uri="{28A0092B-C50C-407E-A947-70E740481C1C}">
+                <a14:useLocalDpi xmlns:a14="http://schemas.microsoft.com/office/drawing/2010/main" val="0"/>
+              </a:ext>
+            </a:extLst>
+          </a:blip>
+          <a:srcRect l="110" t="9928" r="44129" b="3960"/>
+          <a:stretch/>
+        </p:blipFill>
+        <p:spPr>
+          <a:xfrm>
+            <a:off x="700990" y="80146"/>
+            <a:ext cx="4710968" cy="4683406"/>
+          </a:xfrm>
+          <a:prstGeom prst="rect">
+            <a:avLst/>
+          </a:prstGeom>
+        </p:spPr>
+      </p:pic>
+      <p:pic>
+        <p:nvPicPr>
+          <p:cNvPr id="11" name="Picture 10">
+            <a:extLst>
+              <a:ext uri="{FF2B5EF4-FFF2-40B4-BE49-F238E27FC236}">
+                <a16:creationId xmlns:a16="http://schemas.microsoft.com/office/drawing/2014/main" id="{D7012D46-AAD1-4399-94A4-34D4475D0449}"/>
+              </a:ext>
+            </a:extLst>
+          </p:cNvPr>
+          <p:cNvPicPr>
+            <a:picLocks noChangeAspect="1"/>
+          </p:cNvPicPr>
+          <p:nvPr/>
+        </p:nvPicPr>
+        <p:blipFill rotWithShape="1">
+          <a:blip r:embed="rId3">
+            <a:extLst>
+              <a:ext uri="{28A0092B-C50C-407E-A947-70E740481C1C}">
+                <a14:useLocalDpi xmlns:a14="http://schemas.microsoft.com/office/drawing/2010/main" val="0"/>
+              </a:ext>
+            </a:extLst>
+          </a:blip>
+          <a:srcRect r="50904" b="15026"/>
+          <a:stretch/>
+        </p:blipFill>
+        <p:spPr>
+          <a:xfrm>
+            <a:off x="5932076" y="80146"/>
+            <a:ext cx="3427497" cy="4683406"/>
+          </a:xfrm>
+          <a:prstGeom prst="rect">
+            <a:avLst/>
+          </a:prstGeom>
+        </p:spPr>
+      </p:pic>
+      <p:sp>
+        <p:nvSpPr>
+          <p:cNvPr id="14" name="TextBox 13">
+            <a:extLst>
+              <a:ext uri="{FF2B5EF4-FFF2-40B4-BE49-F238E27FC236}">
+                <a16:creationId xmlns:a16="http://schemas.microsoft.com/office/drawing/2014/main" id="{9A2B3F19-C4F6-4114-8F57-2A7A47A16340}"/>
+              </a:ext>
+            </a:extLst>
+          </p:cNvPr>
+          <p:cNvSpPr txBox="1"/>
+          <p:nvPr/>
+        </p:nvSpPr>
+        <p:spPr>
+          <a:xfrm>
+            <a:off x="642267" y="4763552"/>
+            <a:ext cx="1971413" cy="646331"/>
+          </a:xfrm>
+          <a:prstGeom prst="rect">
+            <a:avLst/>
+          </a:prstGeom>
+          <a:noFill/>
+        </p:spPr>
+        <p:txBody>
+          <a:bodyPr wrap="square" rtlCol="0">
+            <a:spAutoFit/>
+          </a:bodyPr>
+          <a:lstStyle/>
+          <a:p>
+            <a:r>
+              <a:rPr lang="en-GB" dirty="0"/>
+              <a:t>This is my domain</a:t>
+            </a:r>
+          </a:p>
+        </p:txBody>
+      </p:sp>
+      <p:sp>
+        <p:nvSpPr>
+          <p:cNvPr id="16" name="TextBox 15">
+            <a:extLst>
+              <a:ext uri="{FF2B5EF4-FFF2-40B4-BE49-F238E27FC236}">
+                <a16:creationId xmlns:a16="http://schemas.microsoft.com/office/drawing/2014/main" id="{F7378300-CC92-41D8-92E0-F36B7AB4BB20}"/>
+              </a:ext>
+            </a:extLst>
+          </p:cNvPr>
+          <p:cNvSpPr txBox="1"/>
+          <p:nvPr/>
+        </p:nvSpPr>
+        <p:spPr>
+          <a:xfrm>
+            <a:off x="5932076" y="4763552"/>
+            <a:ext cx="2550957" cy="369332"/>
+          </a:xfrm>
+          <a:prstGeom prst="rect">
+            <a:avLst/>
+          </a:prstGeom>
+          <a:noFill/>
+        </p:spPr>
+        <p:txBody>
+          <a:bodyPr wrap="square" rtlCol="0">
+            <a:spAutoFit/>
+          </a:bodyPr>
+          <a:lstStyle/>
+          <a:p>
+            <a:r>
+              <a:rPr lang="en-GB" dirty="0"/>
+              <a:t>This is my service</a:t>
+            </a:r>
+          </a:p>
+        </p:txBody>
+      </p:sp>
+    </p:spTree>
+    <p:extLst>
+      <p:ext uri="{BB962C8B-B14F-4D97-AF65-F5344CB8AC3E}">
+        <p14:creationId xmlns:p14="http://schemas.microsoft.com/office/powerpoint/2010/main" val="1197551674"/>
+      </p:ext>
+    </p:extLst>
+  </p:cSld>
+  <p:clrMapOvr>
+    <a:masterClrMapping/>
+  </p:clrMapOvr>
+</p:sld>
+</file>
+
+<file path=ppt/slides/slide7.xml><?xml version="1.0" encoding="utf-8"?>
+<p:sld xmlns:a="http://schemas.openxmlformats.org/drawingml/2006/main" xmlns:r="http://schemas.openxmlformats.org/officeDocument/2006/relationships" xmlns:p="http://schemas.openxmlformats.org/presentationml/2006/main">
+  <p:cSld>
+    <p:spTree>
+      <p:nvGrpSpPr>
+        <p:cNvPr id="1" name=""/>
+        <p:cNvGrpSpPr/>
+        <p:nvPr/>
+      </p:nvGrpSpPr>
+      <p:grpSpPr>
+        <a:xfrm>
+          <a:off x="0" y="0"/>
+          <a:ext cx="0" cy="0"/>
+          <a:chOff x="0" y="0"/>
+          <a:chExt cx="0" cy="0"/>
+        </a:xfrm>
+      </p:grpSpPr>
+      <p:sp>
+        <p:nvSpPr>
+          <p:cNvPr id="2" name="Title 1">
+            <a:extLst>
+              <a:ext uri="{FF2B5EF4-FFF2-40B4-BE49-F238E27FC236}">
+                <a16:creationId xmlns:a16="http://schemas.microsoft.com/office/drawing/2014/main" id="{AA774C82-C852-48E5-903F-09C60D35A82F}"/>
+              </a:ext>
+            </a:extLst>
+          </p:cNvPr>
+          <p:cNvSpPr>
+            <a:spLocks noGrp="1"/>
+          </p:cNvSpPr>
+          <p:nvPr>
+            <p:ph type="title"/>
+          </p:nvPr>
+        </p:nvSpPr>
+        <p:spPr/>
+        <p:txBody>
+          <a:bodyPr/>
+          <a:lstStyle/>
+          <a:p>
+            <a:r>
+              <a:rPr lang="en-GB" dirty="0"/>
+              <a:t>java</a:t>
+            </a:r>
+          </a:p>
+        </p:txBody>
+      </p:sp>
+      <p:pic>
+        <p:nvPicPr>
+          <p:cNvPr id="4" name="Picture 3">
+            <a:extLst>
+              <a:ext uri="{FF2B5EF4-FFF2-40B4-BE49-F238E27FC236}">
+                <a16:creationId xmlns:a16="http://schemas.microsoft.com/office/drawing/2014/main" id="{F6CEDE3E-F614-4D74-96B7-389F2EA1E0E7}"/>
+              </a:ext>
+            </a:extLst>
+          </p:cNvPr>
+          <p:cNvPicPr>
+            <a:picLocks noChangeAspect="1"/>
+          </p:cNvPicPr>
+          <p:nvPr/>
+        </p:nvPicPr>
+        <p:blipFill rotWithShape="1">
+          <a:blip r:embed="rId2">
+            <a:extLst>
+              <a:ext uri="{28A0092B-C50C-407E-A947-70E740481C1C}">
+                <a14:useLocalDpi xmlns:a14="http://schemas.microsoft.com/office/drawing/2010/main" val="0"/>
+              </a:ext>
+            </a:extLst>
+          </a:blip>
+          <a:srcRect r="19762"/>
+          <a:stretch/>
+        </p:blipFill>
+        <p:spPr>
+          <a:xfrm>
+            <a:off x="34507" y="94304"/>
+            <a:ext cx="5226986" cy="4016301"/>
+          </a:xfrm>
+          <a:prstGeom prst="rect">
+            <a:avLst/>
+          </a:prstGeom>
+        </p:spPr>
+      </p:pic>
+      <p:sp>
+        <p:nvSpPr>
+          <p:cNvPr id="5" name="TextBox 4">
+            <a:extLst>
+              <a:ext uri="{FF2B5EF4-FFF2-40B4-BE49-F238E27FC236}">
+                <a16:creationId xmlns:a16="http://schemas.microsoft.com/office/drawing/2014/main" id="{59035D7B-FCFB-490B-90FE-F731D36A7F44}"/>
+              </a:ext>
+            </a:extLst>
+          </p:cNvPr>
+          <p:cNvSpPr txBox="1"/>
+          <p:nvPr/>
+        </p:nvSpPr>
+        <p:spPr>
+          <a:xfrm>
+            <a:off x="34507" y="4118000"/>
+            <a:ext cx="2830776" cy="369332"/>
+          </a:xfrm>
+          <a:prstGeom prst="rect">
+            <a:avLst/>
+          </a:prstGeom>
+          <a:noFill/>
+        </p:spPr>
+        <p:txBody>
+          <a:bodyPr wrap="square" rtlCol="0">
+            <a:spAutoFit/>
+          </a:bodyPr>
+          <a:lstStyle/>
+          <a:p>
+            <a:r>
+              <a:rPr lang="en-GB" dirty="0"/>
+              <a:t>This is my controller</a:t>
+            </a:r>
+          </a:p>
+        </p:txBody>
+      </p:sp>
+      <p:pic>
+        <p:nvPicPr>
+          <p:cNvPr id="6" name="Content Placeholder 4">
+            <a:extLst>
+              <a:ext uri="{FF2B5EF4-FFF2-40B4-BE49-F238E27FC236}">
+                <a16:creationId xmlns:a16="http://schemas.microsoft.com/office/drawing/2014/main" id="{2E0A05A4-3A53-40A7-B293-D525D0A3A00D}"/>
+              </a:ext>
+            </a:extLst>
+          </p:cNvPr>
+          <p:cNvPicPr>
+            <a:picLocks noGrp="1" noChangeAspect="1"/>
+          </p:cNvPicPr>
+          <p:nvPr>
+            <p:ph idx="1"/>
+          </p:nvPr>
+        </p:nvPicPr>
+        <p:blipFill rotWithShape="1">
+          <a:blip r:embed="rId3">
+            <a:extLst>
+              <a:ext uri="{28A0092B-C50C-407E-A947-70E740481C1C}">
+                <a14:useLocalDpi xmlns:a14="http://schemas.microsoft.com/office/drawing/2010/main" val="0"/>
+              </a:ext>
+            </a:extLst>
+          </a:blip>
+          <a:srcRect t="31368" r="11655" b="23541"/>
+          <a:stretch/>
+        </p:blipFill>
+        <p:spPr>
+          <a:xfrm>
+            <a:off x="5703312" y="94304"/>
+            <a:ext cx="6054781" cy="1644242"/>
+          </a:xfrm>
+        </p:spPr>
+      </p:pic>
+      <p:sp>
+        <p:nvSpPr>
+          <p:cNvPr id="8" name="TextBox 7">
+            <a:extLst>
+              <a:ext uri="{FF2B5EF4-FFF2-40B4-BE49-F238E27FC236}">
+                <a16:creationId xmlns:a16="http://schemas.microsoft.com/office/drawing/2014/main" id="{18C5C169-6110-488D-A524-59FBD8806033}"/>
+              </a:ext>
+            </a:extLst>
+          </p:cNvPr>
+          <p:cNvSpPr txBox="1"/>
+          <p:nvPr/>
+        </p:nvSpPr>
+        <p:spPr>
+          <a:xfrm>
+            <a:off x="5703311" y="1759211"/>
+            <a:ext cx="6054779" cy="369332"/>
+          </a:xfrm>
+          <a:prstGeom prst="rect">
+            <a:avLst/>
+          </a:prstGeom>
+          <a:noFill/>
+        </p:spPr>
+        <p:txBody>
+          <a:bodyPr wrap="square" rtlCol="0">
+            <a:spAutoFit/>
+          </a:bodyPr>
+          <a:lstStyle/>
+          <a:p>
+            <a:r>
+              <a:rPr lang="en-GB" dirty="0"/>
+              <a:t>This is my repository originally, this caused problems</a:t>
+            </a:r>
+          </a:p>
+        </p:txBody>
+      </p:sp>
+      <p:pic>
+        <p:nvPicPr>
+          <p:cNvPr id="10" name="Picture 9">
+            <a:extLst>
+              <a:ext uri="{FF2B5EF4-FFF2-40B4-BE49-F238E27FC236}">
+                <a16:creationId xmlns:a16="http://schemas.microsoft.com/office/drawing/2014/main" id="{0BD5FD69-2422-493B-92C4-793FB22B0709}"/>
+              </a:ext>
+            </a:extLst>
+          </p:cNvPr>
+          <p:cNvPicPr>
+            <a:picLocks noChangeAspect="1"/>
+          </p:cNvPicPr>
+          <p:nvPr/>
+        </p:nvPicPr>
+        <p:blipFill rotWithShape="1">
+          <a:blip r:embed="rId4">
+            <a:extLst>
+              <a:ext uri="{28A0092B-C50C-407E-A947-70E740481C1C}">
+                <a14:useLocalDpi xmlns:a14="http://schemas.microsoft.com/office/drawing/2010/main" val="0"/>
+              </a:ext>
+            </a:extLst>
+          </a:blip>
+          <a:srcRect t="7560" b="57827"/>
+          <a:stretch/>
+        </p:blipFill>
+        <p:spPr>
+          <a:xfrm>
+            <a:off x="5703312" y="2484605"/>
+            <a:ext cx="6054780" cy="1140904"/>
+          </a:xfrm>
+          <a:prstGeom prst="rect">
+            <a:avLst/>
+          </a:prstGeom>
+        </p:spPr>
+      </p:pic>
+      <p:sp>
+        <p:nvSpPr>
+          <p:cNvPr id="14" name="TextBox 13">
+            <a:extLst>
+              <a:ext uri="{FF2B5EF4-FFF2-40B4-BE49-F238E27FC236}">
+                <a16:creationId xmlns:a16="http://schemas.microsoft.com/office/drawing/2014/main" id="{8DFD5C93-FDD8-469E-BA60-73983DFEA19E}"/>
+              </a:ext>
+            </a:extLst>
+          </p:cNvPr>
+          <p:cNvSpPr txBox="1"/>
+          <p:nvPr/>
+        </p:nvSpPr>
+        <p:spPr>
+          <a:xfrm>
+            <a:off x="5703310" y="3625509"/>
+            <a:ext cx="6054779" cy="369332"/>
+          </a:xfrm>
+          <a:prstGeom prst="rect">
+            <a:avLst/>
+          </a:prstGeom>
+          <a:noFill/>
+        </p:spPr>
+        <p:txBody>
+          <a:bodyPr wrap="square" rtlCol="0">
+            <a:spAutoFit/>
+          </a:bodyPr>
+          <a:lstStyle/>
+          <a:p>
+            <a:r>
+              <a:rPr lang="en-GB" dirty="0"/>
+              <a:t>This is my repository after it was fixed</a:t>
+            </a:r>
+          </a:p>
+        </p:txBody>
+      </p:sp>
+    </p:spTree>
+    <p:extLst>
+      <p:ext uri="{BB962C8B-B14F-4D97-AF65-F5344CB8AC3E}">
+        <p14:creationId xmlns:p14="http://schemas.microsoft.com/office/powerpoint/2010/main" val="1983804373"/>
+      </p:ext>
+    </p:extLst>
+  </p:cSld>
+  <p:clrMapOvr>
+    <a:masterClrMapping/>
+  </p:clrMapOvr>
+</p:sld>
+</file>
+
+<file path=ppt/slides/slide8.xml><?xml version="1.0" encoding="utf-8"?>
+<p:sld xmlns:a="http://schemas.openxmlformats.org/drawingml/2006/main" xmlns:r="http://schemas.openxmlformats.org/officeDocument/2006/relationships" xmlns:p="http://schemas.openxmlformats.org/presentationml/2006/main">
+  <p:cSld>
+    <p:spTree>
+      <p:nvGrpSpPr>
+        <p:cNvPr id="1" name=""/>
+        <p:cNvGrpSpPr/>
+        <p:nvPr/>
+      </p:nvGrpSpPr>
+      <p:grpSpPr>
+        <a:xfrm>
+          <a:off x="0" y="0"/>
+          <a:ext cx="0" cy="0"/>
+          <a:chOff x="0" y="0"/>
+          <a:chExt cx="0" cy="0"/>
+        </a:xfrm>
+      </p:grpSpPr>
+      <p:sp>
+        <p:nvSpPr>
+          <p:cNvPr id="2" name="Title 1">
+            <a:extLst>
+              <a:ext uri="{FF2B5EF4-FFF2-40B4-BE49-F238E27FC236}">
                 <a16:creationId xmlns:a16="http://schemas.microsoft.com/office/drawing/2014/main" id="{538E5003-B389-4970-86EB-CB1BEAB53E4A}"/>
               </a:ext>
             </a:extLst>
@@ -6243,7 +7638,7 @@
 </p:sld>
 </file>
 
-<file path=ppt/slides/slide7.xml><?xml version="1.0" encoding="utf-8"?>
+<file path=ppt/slides/slide9.xml><?xml version="1.0" encoding="utf-8"?>
 <p:sld xmlns:a="http://schemas.openxmlformats.org/drawingml/2006/main" xmlns:r="http://schemas.openxmlformats.org/officeDocument/2006/relationships" xmlns:p="http://schemas.openxmlformats.org/presentationml/2006/main">
   <p:cSld>
     <p:spTree>
@@ -6351,8 +7746,8 @@
         </p:blipFill>
         <p:spPr>
           <a:xfrm>
-            <a:off x="63510" y="391208"/>
-            <a:ext cx="8417759" cy="3654187"/>
+            <a:off x="63510" y="65046"/>
+            <a:ext cx="8417759" cy="3980350"/>
           </a:xfrm>
           <a:prstGeom prst="rect">
             <a:avLst/>
@@ -6433,403 +7828,6 @@
     <p:extLst>
       <p:ext uri="{BB962C8B-B14F-4D97-AF65-F5344CB8AC3E}">
         <p14:creationId xmlns:p14="http://schemas.microsoft.com/office/powerpoint/2010/main" val="1285451596"/>
-      </p:ext>
-    </p:extLst>
-  </p:cSld>
-  <p:clrMapOvr>
-    <a:masterClrMapping/>
-  </p:clrMapOvr>
-</p:sld>
-</file>
-
-<file path=ppt/slides/slide8.xml><?xml version="1.0" encoding="utf-8"?>
-<p:sld xmlns:a="http://schemas.openxmlformats.org/drawingml/2006/main" xmlns:r="http://schemas.openxmlformats.org/officeDocument/2006/relationships" xmlns:p="http://schemas.openxmlformats.org/presentationml/2006/main">
-  <p:cSld>
-    <p:spTree>
-      <p:nvGrpSpPr>
-        <p:cNvPr id="1" name=""/>
-        <p:cNvGrpSpPr/>
-        <p:nvPr/>
-      </p:nvGrpSpPr>
-      <p:grpSpPr>
-        <a:xfrm>
-          <a:off x="0" y="0"/>
-          <a:ext cx="0" cy="0"/>
-          <a:chOff x="0" y="0"/>
-          <a:chExt cx="0" cy="0"/>
-        </a:xfrm>
-      </p:grpSpPr>
-      <p:sp>
-        <p:nvSpPr>
-          <p:cNvPr id="2" name="Title 1">
-            <a:extLst>
-              <a:ext uri="{FF2B5EF4-FFF2-40B4-BE49-F238E27FC236}">
-                <a16:creationId xmlns:a16="http://schemas.microsoft.com/office/drawing/2014/main" id="{1DF90525-B7BF-4674-94C0-1E13470D8AEE}"/>
-              </a:ext>
-            </a:extLst>
-          </p:cNvPr>
-          <p:cNvSpPr>
-            <a:spLocks noGrp="1"/>
-          </p:cNvSpPr>
-          <p:nvPr>
-            <p:ph type="title"/>
-          </p:nvPr>
-        </p:nvSpPr>
-        <p:spPr/>
-        <p:txBody>
-          <a:bodyPr/>
-          <a:lstStyle/>
-          <a:p>
-            <a:r>
-              <a:rPr lang="en-GB" dirty="0" err="1"/>
-              <a:t>Javascript</a:t>
-            </a:r>
-            <a:endParaRPr lang="en-GB" dirty="0"/>
-          </a:p>
-        </p:txBody>
-      </p:sp>
-      <p:pic>
-        <p:nvPicPr>
-          <p:cNvPr id="5" name="Content Placeholder 4">
-            <a:extLst>
-              <a:ext uri="{FF2B5EF4-FFF2-40B4-BE49-F238E27FC236}">
-                <a16:creationId xmlns:a16="http://schemas.microsoft.com/office/drawing/2014/main" id="{ACBEC5A6-9401-47C4-98D8-370EB2C4CF02}"/>
-              </a:ext>
-            </a:extLst>
-          </p:cNvPr>
-          <p:cNvPicPr>
-            <a:picLocks noGrp="1" noChangeAspect="1"/>
-          </p:cNvPicPr>
-          <p:nvPr>
-            <p:ph idx="1"/>
-          </p:nvPr>
-        </p:nvPicPr>
-        <p:blipFill>
-          <a:blip r:embed="rId2">
-            <a:extLst>
-              <a:ext uri="{28A0092B-C50C-407E-A947-70E740481C1C}">
-                <a14:useLocalDpi xmlns:a14="http://schemas.microsoft.com/office/drawing/2010/main" val="0"/>
-              </a:ext>
-            </a:extLst>
-          </a:blip>
-          <a:stretch>
-            <a:fillRect/>
-          </a:stretch>
-        </p:blipFill>
-        <p:spPr>
-          <a:xfrm>
-            <a:off x="2196703" y="685800"/>
-            <a:ext cx="5509419" cy="3614738"/>
-          </a:xfrm>
-        </p:spPr>
-      </p:pic>
-      <p:pic>
-        <p:nvPicPr>
-          <p:cNvPr id="7" name="Picture 6">
-            <a:extLst>
-              <a:ext uri="{FF2B5EF4-FFF2-40B4-BE49-F238E27FC236}">
-                <a16:creationId xmlns:a16="http://schemas.microsoft.com/office/drawing/2014/main" id="{7280DF53-9550-4D09-A50A-09AB7BF4EB37}"/>
-              </a:ext>
-            </a:extLst>
-          </p:cNvPr>
-          <p:cNvPicPr>
-            <a:picLocks noChangeAspect="1"/>
-          </p:cNvPicPr>
-          <p:nvPr/>
-        </p:nvPicPr>
-        <p:blipFill>
-          <a:blip r:embed="rId3">
-            <a:extLst>
-              <a:ext uri="{28A0092B-C50C-407E-A947-70E740481C1C}">
-                <a14:useLocalDpi xmlns:a14="http://schemas.microsoft.com/office/drawing/2010/main" val="0"/>
-              </a:ext>
-            </a:extLst>
-          </a:blip>
-          <a:stretch>
-            <a:fillRect/>
-          </a:stretch>
-        </p:blipFill>
-        <p:spPr>
-          <a:xfrm>
-            <a:off x="1549823" y="0"/>
-            <a:ext cx="9092354" cy="6858000"/>
-          </a:xfrm>
-          <a:prstGeom prst="rect">
-            <a:avLst/>
-          </a:prstGeom>
-        </p:spPr>
-      </p:pic>
-    </p:spTree>
-    <p:extLst>
-      <p:ext uri="{BB962C8B-B14F-4D97-AF65-F5344CB8AC3E}">
-        <p14:creationId xmlns:p14="http://schemas.microsoft.com/office/powerpoint/2010/main" val="199234571"/>
-      </p:ext>
-    </p:extLst>
-  </p:cSld>
-  <p:clrMapOvr>
-    <a:masterClrMapping/>
-  </p:clrMapOvr>
-</p:sld>
-</file>
-
-<file path=ppt/slides/slide9.xml><?xml version="1.0" encoding="utf-8"?>
-<p:sld xmlns:a="http://schemas.openxmlformats.org/drawingml/2006/main" xmlns:r="http://schemas.openxmlformats.org/officeDocument/2006/relationships" xmlns:p="http://schemas.openxmlformats.org/presentationml/2006/main">
-  <p:cSld>
-    <p:spTree>
-      <p:nvGrpSpPr>
-        <p:cNvPr id="1" name=""/>
-        <p:cNvGrpSpPr/>
-        <p:nvPr/>
-      </p:nvGrpSpPr>
-      <p:grpSpPr>
-        <a:xfrm>
-          <a:off x="0" y="0"/>
-          <a:ext cx="0" cy="0"/>
-          <a:chOff x="0" y="0"/>
-          <a:chExt cx="0" cy="0"/>
-        </a:xfrm>
-      </p:grpSpPr>
-      <p:sp>
-        <p:nvSpPr>
-          <p:cNvPr id="2" name="Title 1">
-            <a:extLst>
-              <a:ext uri="{FF2B5EF4-FFF2-40B4-BE49-F238E27FC236}">
-                <a16:creationId xmlns:a16="http://schemas.microsoft.com/office/drawing/2014/main" id="{605350EF-A703-4114-A8EA-C6ED76E52E88}"/>
-              </a:ext>
-            </a:extLst>
-          </p:cNvPr>
-          <p:cNvSpPr>
-            <a:spLocks noGrp="1"/>
-          </p:cNvSpPr>
-          <p:nvPr>
-            <p:ph type="title"/>
-          </p:nvPr>
-        </p:nvSpPr>
-        <p:spPr/>
-        <p:txBody>
-          <a:bodyPr/>
-          <a:lstStyle/>
-          <a:p>
-            <a:r>
-              <a:rPr lang="en-GB" dirty="0"/>
-              <a:t>testing</a:t>
-            </a:r>
-          </a:p>
-        </p:txBody>
-      </p:sp>
-      <p:pic>
-        <p:nvPicPr>
-          <p:cNvPr id="5" name="Content Placeholder 4">
-            <a:extLst>
-              <a:ext uri="{FF2B5EF4-FFF2-40B4-BE49-F238E27FC236}">
-                <a16:creationId xmlns:a16="http://schemas.microsoft.com/office/drawing/2014/main" id="{43310AD3-E9D5-4362-9815-AF5D6B22E7FE}"/>
-              </a:ext>
-            </a:extLst>
-          </p:cNvPr>
-          <p:cNvPicPr>
-            <a:picLocks noGrp="1" noChangeAspect="1"/>
-          </p:cNvPicPr>
-          <p:nvPr>
-            <p:ph idx="1"/>
-          </p:nvPr>
-        </p:nvPicPr>
-        <p:blipFill rotWithShape="1">
-          <a:blip r:embed="rId2">
-            <a:extLst>
-              <a:ext uri="{28A0092B-C50C-407E-A947-70E740481C1C}">
-                <a14:useLocalDpi xmlns:a14="http://schemas.microsoft.com/office/drawing/2010/main" val="0"/>
-              </a:ext>
-            </a:extLst>
-          </a:blip>
-          <a:srcRect t="1590" r="12909" b="3258"/>
-          <a:stretch/>
-        </p:blipFill>
-        <p:spPr>
-          <a:xfrm>
-            <a:off x="0" y="0"/>
-            <a:ext cx="6343331" cy="3598877"/>
-          </a:xfrm>
-        </p:spPr>
-      </p:pic>
-      <p:pic>
-        <p:nvPicPr>
-          <p:cNvPr id="7" name="Picture 6">
-            <a:extLst>
-              <a:ext uri="{FF2B5EF4-FFF2-40B4-BE49-F238E27FC236}">
-                <a16:creationId xmlns:a16="http://schemas.microsoft.com/office/drawing/2014/main" id="{70C38BD8-902E-4D4D-B389-FD69A4D17AC9}"/>
-              </a:ext>
-            </a:extLst>
-          </p:cNvPr>
-          <p:cNvPicPr>
-            <a:picLocks noChangeAspect="1"/>
-          </p:cNvPicPr>
-          <p:nvPr/>
-        </p:nvPicPr>
-        <p:blipFill rotWithShape="1">
-          <a:blip r:embed="rId3">
-            <a:extLst>
-              <a:ext uri="{28A0092B-C50C-407E-A947-70E740481C1C}">
-                <a14:useLocalDpi xmlns:a14="http://schemas.microsoft.com/office/drawing/2010/main" val="0"/>
-              </a:ext>
-            </a:extLst>
-          </a:blip>
-          <a:srcRect r="24705" b="33660"/>
-          <a:stretch/>
-        </p:blipFill>
-        <p:spPr>
-          <a:xfrm>
-            <a:off x="6453430" y="19877"/>
-            <a:ext cx="5651883" cy="1779561"/>
-          </a:xfrm>
-          <a:prstGeom prst="rect">
-            <a:avLst/>
-          </a:prstGeom>
-        </p:spPr>
-      </p:pic>
-      <p:pic>
-        <p:nvPicPr>
-          <p:cNvPr id="9" name="Picture 8">
-            <a:extLst>
-              <a:ext uri="{FF2B5EF4-FFF2-40B4-BE49-F238E27FC236}">
-                <a16:creationId xmlns:a16="http://schemas.microsoft.com/office/drawing/2014/main" id="{B1EB4ED0-3A9A-411D-8DD0-311749B9FD8B}"/>
-              </a:ext>
-            </a:extLst>
-          </p:cNvPr>
-          <p:cNvPicPr>
-            <a:picLocks noChangeAspect="1"/>
-          </p:cNvPicPr>
-          <p:nvPr/>
-        </p:nvPicPr>
-        <p:blipFill rotWithShape="1">
-          <a:blip r:embed="rId4">
-            <a:extLst>
-              <a:ext uri="{28A0092B-C50C-407E-A947-70E740481C1C}">
-                <a14:useLocalDpi xmlns:a14="http://schemas.microsoft.com/office/drawing/2010/main" val="0"/>
-              </a:ext>
-            </a:extLst>
-          </a:blip>
-          <a:srcRect t="41312" r="18625" b="7346"/>
-          <a:stretch/>
-        </p:blipFill>
-        <p:spPr>
-          <a:xfrm>
-            <a:off x="6482562" y="2230925"/>
-            <a:ext cx="5622751" cy="1931086"/>
-          </a:xfrm>
-          <a:prstGeom prst="rect">
-            <a:avLst/>
-          </a:prstGeom>
-        </p:spPr>
-      </p:pic>
-      <p:sp>
-        <p:nvSpPr>
-          <p:cNvPr id="10" name="TextBox 9">
-            <a:extLst>
-              <a:ext uri="{FF2B5EF4-FFF2-40B4-BE49-F238E27FC236}">
-                <a16:creationId xmlns:a16="http://schemas.microsoft.com/office/drawing/2014/main" id="{1B4EFAAB-9080-4AFC-88E4-FFAC8238CB05}"/>
-              </a:ext>
-            </a:extLst>
-          </p:cNvPr>
-          <p:cNvSpPr txBox="1"/>
-          <p:nvPr/>
-        </p:nvSpPr>
-        <p:spPr>
-          <a:xfrm>
-            <a:off x="86687" y="3598877"/>
-            <a:ext cx="2830776" cy="369332"/>
-          </a:xfrm>
-          <a:prstGeom prst="rect">
-            <a:avLst/>
-          </a:prstGeom>
-          <a:noFill/>
-        </p:spPr>
-        <p:txBody>
-          <a:bodyPr wrap="square" rtlCol="0">
-            <a:spAutoFit/>
-          </a:bodyPr>
-          <a:lstStyle/>
-          <a:p>
-            <a:r>
-              <a:rPr lang="en-GB" dirty="0"/>
-              <a:t>Integration testing</a:t>
-            </a:r>
-          </a:p>
-        </p:txBody>
-      </p:sp>
-      <p:sp>
-        <p:nvSpPr>
-          <p:cNvPr id="11" name="TextBox 10">
-            <a:extLst>
-              <a:ext uri="{FF2B5EF4-FFF2-40B4-BE49-F238E27FC236}">
-                <a16:creationId xmlns:a16="http://schemas.microsoft.com/office/drawing/2014/main" id="{A50680C2-7407-45A2-97A7-C0201BA8A4AC}"/>
-              </a:ext>
-            </a:extLst>
-          </p:cNvPr>
-          <p:cNvSpPr txBox="1"/>
-          <p:nvPr/>
-        </p:nvSpPr>
-        <p:spPr>
-          <a:xfrm>
-            <a:off x="6589552" y="1777433"/>
-            <a:ext cx="3166843" cy="369332"/>
-          </a:xfrm>
-          <a:prstGeom prst="rect">
-            <a:avLst/>
-          </a:prstGeom>
-          <a:noFill/>
-        </p:spPr>
-        <p:txBody>
-          <a:bodyPr wrap="square" rtlCol="0">
-            <a:spAutoFit/>
-          </a:bodyPr>
-          <a:lstStyle/>
-          <a:p>
-            <a:r>
-              <a:rPr lang="en-GB" dirty="0"/>
-              <a:t>Integration testing results</a:t>
-            </a:r>
-          </a:p>
-        </p:txBody>
-      </p:sp>
-      <p:sp>
-        <p:nvSpPr>
-          <p:cNvPr id="12" name="TextBox 11">
-            <a:extLst>
-              <a:ext uri="{FF2B5EF4-FFF2-40B4-BE49-F238E27FC236}">
-                <a16:creationId xmlns:a16="http://schemas.microsoft.com/office/drawing/2014/main" id="{68AC737F-99D2-492C-B4A2-29221A3D27F3}"/>
-              </a:ext>
-            </a:extLst>
-          </p:cNvPr>
-          <p:cNvSpPr txBox="1"/>
-          <p:nvPr/>
-        </p:nvSpPr>
-        <p:spPr>
-          <a:xfrm>
-            <a:off x="6482561" y="4224166"/>
-            <a:ext cx="4381181" cy="369332"/>
-          </a:xfrm>
-          <a:prstGeom prst="rect">
-            <a:avLst/>
-          </a:prstGeom>
-          <a:noFill/>
-        </p:spPr>
-        <p:txBody>
-          <a:bodyPr wrap="square" rtlCol="0">
-            <a:spAutoFit/>
-          </a:bodyPr>
-          <a:lstStyle/>
-          <a:p>
-            <a:r>
-              <a:rPr lang="en-GB" dirty="0"/>
-              <a:t>Results when unit testing was added</a:t>
-            </a:r>
-          </a:p>
-        </p:txBody>
-      </p:sp>
-    </p:spTree>
-    <p:extLst>
-      <p:ext uri="{BB962C8B-B14F-4D97-AF65-F5344CB8AC3E}">
-        <p14:creationId xmlns:p14="http://schemas.microsoft.com/office/powerpoint/2010/main" val="1128193384"/>
       </p:ext>
     </p:extLst>
   </p:cSld>

</xml_diff>

<commit_message>
CN-15 #comment ZZ: Delete all functionality added to the application, user story satisfied
</commit_message>
<xml_diff>
--- a/documentation/presentation/presentation.pptx
+++ b/documentation/presentation/presentation.pptx
@@ -6347,8 +6347,13 @@
           <a:p>
             <a:r>
               <a:rPr lang="en-GB" dirty="0"/>
-              <a:t>What would I change – add some animation to the front end of the application, possibly additional methods for the CRUD such as delete-all which was planned</a:t>
-            </a:r>
+              <a:t>What would I change – add some animation to the front end of the application, possibly some </a:t>
+            </a:r>
+            <a:r>
+              <a:rPr lang="en-GB"/>
+              <a:t>additional modals too</a:t>
+            </a:r>
+            <a:endParaRPr lang="en-GB" dirty="0"/>
           </a:p>
           <a:p>
             <a:endParaRPr lang="en-GB" dirty="0"/>

</xml_diff>

<commit_message>
CN-20 #comment ZZ: Finishing changes added, modal added - dev ready to merge to main
</commit_message>
<xml_diff>
--- a/documentation/presentation/presentation.pptx
+++ b/documentation/presentation/presentation.pptx
@@ -316,7 +316,7 @@
           <a:p>
             <a:fld id="{396F97AF-2896-4B32-9C04-23395DF80B2F}" type="datetimeFigureOut">
               <a:rPr lang="en-GB" smtClean="0"/>
-              <a:t>20/04/2022</a:t>
+              <a:t>21/04/2022</a:t>
             </a:fld>
             <a:endParaRPr lang="en-GB"/>
           </a:p>
@@ -752,7 +752,7 @@
           <a:p>
             <a:fld id="{396F97AF-2896-4B32-9C04-23395DF80B2F}" type="datetimeFigureOut">
               <a:rPr lang="en-GB" smtClean="0"/>
-              <a:t>20/04/2022</a:t>
+              <a:t>21/04/2022</a:t>
             </a:fld>
             <a:endParaRPr lang="en-GB"/>
           </a:p>
@@ -1002,7 +1002,7 @@
           <a:p>
             <a:fld id="{396F97AF-2896-4B32-9C04-23395DF80B2F}" type="datetimeFigureOut">
               <a:rPr lang="en-GB" smtClean="0"/>
-              <a:t>20/04/2022</a:t>
+              <a:t>21/04/2022</a:t>
             </a:fld>
             <a:endParaRPr lang="en-GB"/>
           </a:p>
@@ -1310,7 +1310,7 @@
           <a:p>
             <a:fld id="{396F97AF-2896-4B32-9C04-23395DF80B2F}" type="datetimeFigureOut">
               <a:rPr lang="en-GB" smtClean="0"/>
-              <a:t>20/04/2022</a:t>
+              <a:t>21/04/2022</a:t>
             </a:fld>
             <a:endParaRPr lang="en-GB"/>
           </a:p>
@@ -1628,7 +1628,7 @@
           <a:p>
             <a:fld id="{396F97AF-2896-4B32-9C04-23395DF80B2F}" type="datetimeFigureOut">
               <a:rPr lang="en-GB" smtClean="0"/>
-              <a:t>20/04/2022</a:t>
+              <a:t>21/04/2022</a:t>
             </a:fld>
             <a:endParaRPr lang="en-GB"/>
           </a:p>
@@ -1930,7 +1930,7 @@
           <a:p>
             <a:fld id="{396F97AF-2896-4B32-9C04-23395DF80B2F}" type="datetimeFigureOut">
               <a:rPr lang="en-GB" smtClean="0"/>
-              <a:t>20/04/2022</a:t>
+              <a:t>21/04/2022</a:t>
             </a:fld>
             <a:endParaRPr lang="en-GB"/>
           </a:p>
@@ -2297,7 +2297,7 @@
           <a:p>
             <a:fld id="{396F97AF-2896-4B32-9C04-23395DF80B2F}" type="datetimeFigureOut">
               <a:rPr lang="en-GB" smtClean="0"/>
-              <a:t>20/04/2022</a:t>
+              <a:t>21/04/2022</a:t>
             </a:fld>
             <a:endParaRPr lang="en-GB"/>
           </a:p>
@@ -2471,7 +2471,7 @@
           <a:p>
             <a:fld id="{396F97AF-2896-4B32-9C04-23395DF80B2F}" type="datetimeFigureOut">
               <a:rPr lang="en-GB" smtClean="0"/>
-              <a:t>20/04/2022</a:t>
+              <a:t>21/04/2022</a:t>
             </a:fld>
             <a:endParaRPr lang="en-GB"/>
           </a:p>
@@ -2651,7 +2651,7 @@
           <a:p>
             <a:fld id="{396F97AF-2896-4B32-9C04-23395DF80B2F}" type="datetimeFigureOut">
               <a:rPr lang="en-GB" smtClean="0"/>
-              <a:t>20/04/2022</a:t>
+              <a:t>21/04/2022</a:t>
             </a:fld>
             <a:endParaRPr lang="en-GB"/>
           </a:p>
@@ -2821,7 +2821,7 @@
           <a:p>
             <a:fld id="{396F97AF-2896-4B32-9C04-23395DF80B2F}" type="datetimeFigureOut">
               <a:rPr lang="en-GB" smtClean="0"/>
-              <a:t>20/04/2022</a:t>
+              <a:t>21/04/2022</a:t>
             </a:fld>
             <a:endParaRPr lang="en-GB"/>
           </a:p>
@@ -3071,7 +3071,7 @@
           <a:p>
             <a:fld id="{396F97AF-2896-4B32-9C04-23395DF80B2F}" type="datetimeFigureOut">
               <a:rPr lang="en-GB" smtClean="0"/>
-              <a:t>20/04/2022</a:t>
+              <a:t>21/04/2022</a:t>
             </a:fld>
             <a:endParaRPr lang="en-GB"/>
           </a:p>
@@ -3307,7 +3307,7 @@
           <a:p>
             <a:fld id="{396F97AF-2896-4B32-9C04-23395DF80B2F}" type="datetimeFigureOut">
               <a:rPr lang="en-GB" smtClean="0"/>
-              <a:t>20/04/2022</a:t>
+              <a:t>21/04/2022</a:t>
             </a:fld>
             <a:endParaRPr lang="en-GB"/>
           </a:p>
@@ -3689,7 +3689,7 @@
           <a:p>
             <a:fld id="{396F97AF-2896-4B32-9C04-23395DF80B2F}" type="datetimeFigureOut">
               <a:rPr lang="en-GB" smtClean="0"/>
-              <a:t>20/04/2022</a:t>
+              <a:t>21/04/2022</a:t>
             </a:fld>
             <a:endParaRPr lang="en-GB"/>
           </a:p>
@@ -3807,7 +3807,7 @@
           <a:p>
             <a:fld id="{396F97AF-2896-4B32-9C04-23395DF80B2F}" type="datetimeFigureOut">
               <a:rPr lang="en-GB" smtClean="0"/>
-              <a:t>20/04/2022</a:t>
+              <a:t>21/04/2022</a:t>
             </a:fld>
             <a:endParaRPr lang="en-GB"/>
           </a:p>
@@ -3902,7 +3902,7 @@
           <a:p>
             <a:fld id="{396F97AF-2896-4B32-9C04-23395DF80B2F}" type="datetimeFigureOut">
               <a:rPr lang="en-GB" smtClean="0"/>
-              <a:t>20/04/2022</a:t>
+              <a:t>21/04/2022</a:t>
             </a:fld>
             <a:endParaRPr lang="en-GB"/>
           </a:p>
@@ -4157,7 +4157,7 @@
           <a:p>
             <a:fld id="{396F97AF-2896-4B32-9C04-23395DF80B2F}" type="datetimeFigureOut">
               <a:rPr lang="en-GB" smtClean="0"/>
-              <a:t>20/04/2022</a:t>
+              <a:t>21/04/2022</a:t>
             </a:fld>
             <a:endParaRPr lang="en-GB"/>
           </a:p>
@@ -4440,7 +4440,7 @@
           <a:p>
             <a:fld id="{396F97AF-2896-4B32-9C04-23395DF80B2F}" type="datetimeFigureOut">
               <a:rPr lang="en-GB" smtClean="0"/>
-              <a:t>20/04/2022</a:t>
+              <a:t>21/04/2022</a:t>
             </a:fld>
             <a:endParaRPr lang="en-GB"/>
           </a:p>
@@ -4846,7 +4846,7 @@
           <a:p>
             <a:fld id="{396F97AF-2896-4B32-9C04-23395DF80B2F}" type="datetimeFigureOut">
               <a:rPr lang="en-GB" smtClean="0"/>
-              <a:t>20/04/2022</a:t>
+              <a:t>21/04/2022</a:t>
             </a:fld>
             <a:endParaRPr lang="en-GB"/>
           </a:p>
@@ -6341,19 +6341,14 @@
           <a:p>
             <a:r>
               <a:rPr lang="en-GB" dirty="0"/>
-              <a:t>What went bad – chrome compatibility and problems with naming additional functions in the repository</a:t>
+              <a:t>What went bad – chrome accessibility and problems with naming additional functions in the repository</a:t>
             </a:r>
           </a:p>
           <a:p>
             <a:r>
               <a:rPr lang="en-GB" dirty="0"/>
-              <a:t>What would I change – add some animation to the front end of the application, possibly some </a:t>
-            </a:r>
-            <a:r>
-              <a:rPr lang="en-GB"/>
-              <a:t>additional modals too</a:t>
-            </a:r>
-            <a:endParaRPr lang="en-GB" dirty="0"/>
+              <a:t>What would I change – add some animation to the front end of the application, possibly deal with the issues in chrome by displaying the page differently in chrome</a:t>
+            </a:r>
           </a:p>
           <a:p>
             <a:endParaRPr lang="en-GB" dirty="0"/>

</xml_diff>